<commit_message>
added a few new talks I've done
</commit_message>
<xml_diff>
--- a/greenpeace/ComfortableChaos.pptx
+++ b/greenpeace/ComfortableChaos.pptx
@@ -21,6 +21,7 @@
     <p:sldId id="266" r:id="rId18"/>
     <p:sldId id="267" r:id="rId19"/>
     <p:sldId id="268" r:id="rId20"/>
+    <p:sldId id="269" r:id="rId21"/>
   </p:sldIdLst>
   <p:sldSz cx="9144000" cy="5143500"/>
   <p:notesSz cx="6858000" cy="9144000"/>
@@ -75,10 +76,10 @@
         </a:solidFill>
         <a:effectLst/>
         <a:uFillTx/>
-        <a:latin typeface="Arial"/>
-        <a:ea typeface="Arial"/>
-        <a:cs typeface="Arial"/>
-        <a:sym typeface="Arial"/>
+        <a:latin typeface="+mn-lt"/>
+        <a:ea typeface="+mn-ea"/>
+        <a:cs typeface="+mn-cs"/>
+        <a:sym typeface="Helvetica"/>
       </a:defRPr>
     </a:lvl1pPr>
     <a:lvl2pPr marL="0" marR="0" indent="0" algn="l" defTabSz="914400" rtl="0" fontAlgn="auto" latinLnBrk="0" hangingPunct="0">
@@ -105,10 +106,10 @@
         </a:solidFill>
         <a:effectLst/>
         <a:uFillTx/>
-        <a:latin typeface="Arial"/>
-        <a:ea typeface="Arial"/>
-        <a:cs typeface="Arial"/>
-        <a:sym typeface="Arial"/>
+        <a:latin typeface="+mn-lt"/>
+        <a:ea typeface="+mn-ea"/>
+        <a:cs typeface="+mn-cs"/>
+        <a:sym typeface="Helvetica"/>
       </a:defRPr>
     </a:lvl2pPr>
     <a:lvl3pPr marL="0" marR="0" indent="0" algn="l" defTabSz="914400" rtl="0" fontAlgn="auto" latinLnBrk="0" hangingPunct="0">
@@ -135,10 +136,10 @@
         </a:solidFill>
         <a:effectLst/>
         <a:uFillTx/>
-        <a:latin typeface="Arial"/>
-        <a:ea typeface="Arial"/>
-        <a:cs typeface="Arial"/>
-        <a:sym typeface="Arial"/>
+        <a:latin typeface="+mn-lt"/>
+        <a:ea typeface="+mn-ea"/>
+        <a:cs typeface="+mn-cs"/>
+        <a:sym typeface="Helvetica"/>
       </a:defRPr>
     </a:lvl3pPr>
     <a:lvl4pPr marL="0" marR="0" indent="0" algn="l" defTabSz="914400" rtl="0" fontAlgn="auto" latinLnBrk="0" hangingPunct="0">
@@ -165,10 +166,10 @@
         </a:solidFill>
         <a:effectLst/>
         <a:uFillTx/>
-        <a:latin typeface="Arial"/>
-        <a:ea typeface="Arial"/>
-        <a:cs typeface="Arial"/>
-        <a:sym typeface="Arial"/>
+        <a:latin typeface="+mn-lt"/>
+        <a:ea typeface="+mn-ea"/>
+        <a:cs typeface="+mn-cs"/>
+        <a:sym typeface="Helvetica"/>
       </a:defRPr>
     </a:lvl4pPr>
     <a:lvl5pPr marL="0" marR="0" indent="0" algn="l" defTabSz="914400" rtl="0" fontAlgn="auto" latinLnBrk="0" hangingPunct="0">
@@ -195,10 +196,10 @@
         </a:solidFill>
         <a:effectLst/>
         <a:uFillTx/>
-        <a:latin typeface="Arial"/>
-        <a:ea typeface="Arial"/>
-        <a:cs typeface="Arial"/>
-        <a:sym typeface="Arial"/>
+        <a:latin typeface="+mn-lt"/>
+        <a:ea typeface="+mn-ea"/>
+        <a:cs typeface="+mn-cs"/>
+        <a:sym typeface="Helvetica"/>
       </a:defRPr>
     </a:lvl5pPr>
     <a:lvl6pPr marL="0" marR="0" indent="0" algn="l" defTabSz="914400" rtl="0" fontAlgn="auto" latinLnBrk="0" hangingPunct="0">
@@ -225,10 +226,10 @@
         </a:solidFill>
         <a:effectLst/>
         <a:uFillTx/>
-        <a:latin typeface="Arial"/>
-        <a:ea typeface="Arial"/>
-        <a:cs typeface="Arial"/>
-        <a:sym typeface="Arial"/>
+        <a:latin typeface="+mn-lt"/>
+        <a:ea typeface="+mn-ea"/>
+        <a:cs typeface="+mn-cs"/>
+        <a:sym typeface="Helvetica"/>
       </a:defRPr>
     </a:lvl6pPr>
     <a:lvl7pPr marL="0" marR="0" indent="0" algn="l" defTabSz="914400" rtl="0" fontAlgn="auto" latinLnBrk="0" hangingPunct="0">
@@ -255,10 +256,10 @@
         </a:solidFill>
         <a:effectLst/>
         <a:uFillTx/>
-        <a:latin typeface="Arial"/>
-        <a:ea typeface="Arial"/>
-        <a:cs typeface="Arial"/>
-        <a:sym typeface="Arial"/>
+        <a:latin typeface="+mn-lt"/>
+        <a:ea typeface="+mn-ea"/>
+        <a:cs typeface="+mn-cs"/>
+        <a:sym typeface="Helvetica"/>
       </a:defRPr>
     </a:lvl7pPr>
     <a:lvl8pPr marL="0" marR="0" indent="0" algn="l" defTabSz="914400" rtl="0" fontAlgn="auto" latinLnBrk="0" hangingPunct="0">
@@ -285,10 +286,10 @@
         </a:solidFill>
         <a:effectLst/>
         <a:uFillTx/>
-        <a:latin typeface="Arial"/>
-        <a:ea typeface="Arial"/>
-        <a:cs typeface="Arial"/>
-        <a:sym typeface="Arial"/>
+        <a:latin typeface="+mn-lt"/>
+        <a:ea typeface="+mn-ea"/>
+        <a:cs typeface="+mn-cs"/>
+        <a:sym typeface="Helvetica"/>
       </a:defRPr>
     </a:lvl8pPr>
     <a:lvl9pPr marL="0" marR="0" indent="0" algn="l" defTabSz="914400" rtl="0" fontAlgn="auto" latinLnBrk="0" hangingPunct="0">
@@ -315,10 +316,10 @@
         </a:solidFill>
         <a:effectLst/>
         <a:uFillTx/>
-        <a:latin typeface="Arial"/>
-        <a:ea typeface="Arial"/>
-        <a:cs typeface="Arial"/>
-        <a:sym typeface="Arial"/>
+        <a:latin typeface="+mn-lt"/>
+        <a:ea typeface="+mn-ea"/>
+        <a:cs typeface="+mn-cs"/>
+        <a:sym typeface="Helvetica"/>
       </a:defRPr>
     </a:lvl9pPr>
   </p:defaultTextStyle>
@@ -629,16 +630,10 @@
           <a:bodyPr/>
           <a:lstStyle/>
           <a:p>
-            <a:pPr lvl="1" marL="914400" indent="-298450">
+            <a:pPr>
               <a:lnSpc>
                 <a:spcPct val="115000"/>
               </a:lnSpc>
-              <a:buClr>
-                <a:srgbClr val="000000"/>
-              </a:buClr>
-              <a:buSzPct val="100000"/>
-              <a:buFont typeface="Open Sans"/>
-              <a:buChar char="○"/>
               <a:defRPr sz="1100">
                 <a:latin typeface="Open Sans"/>
                 <a:ea typeface="Open Sans"/>
@@ -647,7 +642,214 @@
               </a:defRPr>
             </a:pPr>
             <a:r>
-              <a:t>Having a corner of the web you control so you can publish your outputs. </a:t>
+              <a:t>How does this work? Practically?</a:t>
+            </a:r>
+          </a:p>
+          <a:p>
+            <a:pPr>
+              <a:lnSpc>
+                <a:spcPct val="115000"/>
+              </a:lnSpc>
+              <a:defRPr sz="1100">
+                <a:latin typeface="Open Sans"/>
+                <a:ea typeface="Open Sans"/>
+                <a:cs typeface="Open Sans"/>
+                <a:sym typeface="Open Sans"/>
+              </a:defRPr>
+            </a:pPr>
+          </a:p>
+          <a:p>
+            <a:pPr>
+              <a:lnSpc>
+                <a:spcPct val="115000"/>
+              </a:lnSpc>
+              <a:defRPr b="1" sz="1100">
+                <a:latin typeface="Open Sans"/>
+                <a:ea typeface="Open Sans"/>
+                <a:cs typeface="Open Sans"/>
+                <a:sym typeface="Open Sans"/>
+              </a:defRPr>
+            </a:pPr>
+            <a:r>
+              <a:t>Every project team is different, so you need to work together to define which structures work for your team. This is a negotiation</a:t>
+            </a:r>
+            <a:r>
+              <a:rPr b="0"/>
+              <a:t> because our brains function differently. In an open project it’s massively important to think about how transparency, decentralization and hackability are represented in your management structures. </a:t>
+            </a:r>
+          </a:p>
+          <a:p>
+            <a:pPr>
+              <a:lnSpc>
+                <a:spcPct val="115000"/>
+              </a:lnSpc>
+              <a:defRPr sz="1100">
+                <a:latin typeface="Open Sans"/>
+                <a:ea typeface="Open Sans"/>
+                <a:cs typeface="Open Sans"/>
+                <a:sym typeface="Open Sans"/>
+              </a:defRPr>
+            </a:pPr>
+          </a:p>
+          <a:p>
+            <a:pPr>
+              <a:lnSpc>
+                <a:spcPct val="115000"/>
+              </a:lnSpc>
+              <a:defRPr sz="1100">
+                <a:latin typeface="Open Sans"/>
+                <a:ea typeface="Open Sans"/>
+                <a:cs typeface="Open Sans"/>
+                <a:sym typeface="Open Sans"/>
+              </a:defRPr>
+            </a:pPr>
+            <a:r>
+              <a:t>The Planet 4 team negotiated over months. Not days. We made decisions as we went, changed our minds, and went through the process of getting to know how each individual works. We made compromises to each other. </a:t>
+            </a:r>
+          </a:p>
+          <a:p>
+            <a:pPr>
+              <a:lnSpc>
+                <a:spcPct val="115000"/>
+              </a:lnSpc>
+              <a:defRPr sz="1100">
+                <a:latin typeface="Open Sans"/>
+                <a:ea typeface="Open Sans"/>
+                <a:cs typeface="Open Sans"/>
+                <a:sym typeface="Open Sans"/>
+              </a:defRPr>
+            </a:pPr>
+          </a:p>
+          <a:p>
+            <a:pPr>
+              <a:lnSpc>
+                <a:spcPct val="115000"/>
+              </a:lnSpc>
+              <a:defRPr sz="1100">
+                <a:latin typeface="Open Sans"/>
+                <a:ea typeface="Open Sans"/>
+                <a:cs typeface="Open Sans"/>
+                <a:sym typeface="Open Sans"/>
+              </a:defRPr>
+            </a:pPr>
+            <a:r>
+              <a:t>I urge colleagues to publish links to every document, image, bug and product to get them thinking about open practices through practice. Giving people agency is the reason I serve as a model regardless of perceived power dynamics. This has gotten me into loads of trouble, but modeling the behaviors you want to see in the world is the only way you can adequately affect change.</a:t>
+            </a:r>
+          </a:p>
+          <a:p>
+            <a:pPr>
+              <a:lnSpc>
+                <a:spcPct val="115000"/>
+              </a:lnSpc>
+              <a:defRPr sz="1100">
+                <a:latin typeface="Open Sans"/>
+                <a:ea typeface="Open Sans"/>
+                <a:cs typeface="Open Sans"/>
+                <a:sym typeface="Open Sans"/>
+              </a:defRPr>
+            </a:pPr>
+          </a:p>
+          <a:p>
+            <a:pPr>
+              <a:lnSpc>
+                <a:spcPct val="115000"/>
+              </a:lnSpc>
+              <a:defRPr sz="1100">
+                <a:latin typeface="Open Sans"/>
+                <a:ea typeface="Open Sans"/>
+                <a:cs typeface="Open Sans"/>
+                <a:sym typeface="Open Sans"/>
+              </a:defRPr>
+            </a:pPr>
+            <a:r>
+              <a:t>I organize my own work around the idea that other people can participate. I set up systems that they can use. I adjust to their technical and social skill level.</a:t>
+            </a:r>
+          </a:p>
+          <a:p>
+            <a:pPr>
+              <a:lnSpc>
+                <a:spcPct val="115000"/>
+              </a:lnSpc>
+              <a:defRPr sz="1100">
+                <a:latin typeface="Open Sans"/>
+                <a:ea typeface="Open Sans"/>
+                <a:cs typeface="Open Sans"/>
+                <a:sym typeface="Open Sans"/>
+              </a:defRPr>
+            </a:pPr>
+          </a:p>
+          <a:p>
+            <a:pPr>
+              <a:lnSpc>
+                <a:spcPct val="115000"/>
+              </a:lnSpc>
+              <a:defRPr sz="1100">
+                <a:latin typeface="Open Sans"/>
+                <a:ea typeface="Open Sans"/>
+                <a:cs typeface="Open Sans"/>
+                <a:sym typeface="Open Sans"/>
+              </a:defRPr>
+            </a:pPr>
+            <a:r>
+              <a:t>I believe that together we are smarter. Participation is key for any organization looking to change the world, so getting people to trust in best intentions again is part of making the world a better place.</a:t>
+            </a:r>
+          </a:p>
+          <a:p>
+            <a:pPr>
+              <a:lnSpc>
+                <a:spcPct val="115000"/>
+              </a:lnSpc>
+              <a:defRPr sz="1100">
+                <a:latin typeface="Open Sans"/>
+                <a:ea typeface="Open Sans"/>
+                <a:cs typeface="Open Sans"/>
+                <a:sym typeface="Open Sans"/>
+              </a:defRPr>
+            </a:pPr>
+          </a:p>
+          <a:p>
+            <a:pPr>
+              <a:lnSpc>
+                <a:spcPct val="115000"/>
+              </a:lnSpc>
+              <a:defRPr sz="1100">
+                <a:latin typeface="Open Sans"/>
+                <a:ea typeface="Open Sans"/>
+                <a:cs typeface="Open Sans"/>
+                <a:sym typeface="Open Sans"/>
+              </a:defRPr>
+            </a:pPr>
+            <a:r>
+              <a:t>Shifting the behaviors and mindsets of “everyone”, which, by the way is every non-profits target audience, means that we need the input and understanding of “everyone”. We have to stop pretending like we can save the planet without the “masses”.</a:t>
+            </a:r>
+          </a:p>
+          <a:p>
+            <a:pPr>
+              <a:lnSpc>
+                <a:spcPct val="115000"/>
+              </a:lnSpc>
+              <a:defRPr sz="1100">
+                <a:latin typeface="Open Sans"/>
+                <a:ea typeface="Open Sans"/>
+                <a:cs typeface="Open Sans"/>
+                <a:sym typeface="Open Sans"/>
+              </a:defRPr>
+            </a:pPr>
+          </a:p>
+          <a:p>
+            <a:pPr>
+              <a:lnSpc>
+                <a:spcPct val="115000"/>
+              </a:lnSpc>
+              <a:defRPr sz="1100">
+                <a:latin typeface="Open Sans"/>
+                <a:ea typeface="Open Sans"/>
+                <a:cs typeface="Open Sans"/>
+                <a:sym typeface="Open Sans"/>
+              </a:defRPr>
+            </a:pPr>
+            <a:r>
+              <a:t>I’ve learned that you have to help people understand why their participation is necessary and create systems that make participation easy. You have to help people understand what you’re working on, and you have to respect peoples contributions. Most importantly, you have to model the behaviors you want to see in the world.</a:t>
             </a:r>
           </a:p>
         </p:txBody>
@@ -715,86 +917,25 @@
           <a:bodyPr/>
           <a:lstStyle/>
           <a:p>
-            <a:pPr>
-              <a:defRPr sz="1100"/>
+            <a:pPr lvl="1" marL="914400" indent="-298450">
+              <a:lnSpc>
+                <a:spcPct val="115000"/>
+              </a:lnSpc>
+              <a:buClr>
+                <a:srgbClr val="000000"/>
+              </a:buClr>
+              <a:buSzPct val="100000"/>
+              <a:buFont typeface="Open Sans"/>
+              <a:buChar char="○"/>
+              <a:defRPr sz="1100">
+                <a:latin typeface="Open Sans"/>
+                <a:ea typeface="Open Sans"/>
+                <a:cs typeface="Open Sans"/>
+                <a:sym typeface="Open Sans"/>
+              </a:defRPr>
             </a:pPr>
             <a:r>
-              <a:t>Since open is inherently about making sure that people have agency, the project management needs to be designed in a way that coordinates people but gives them freedom.</a:t>
-            </a:r>
-          </a:p>
-          <a:p>
-            <a:pPr>
-              <a:defRPr sz="1100"/>
-            </a:pPr>
-          </a:p>
-          <a:p>
-            <a:pPr>
-              <a:defRPr sz="1100"/>
-            </a:pPr>
-            <a:r>
-              <a:t>Every two weeks, the Planet 4 team comes together to define high level, achievable goals for the sprint. Subteams then refine those goals into specific tasks based on their areas of focus. Once agreed, tasks are</a:t>
-            </a:r>
-            <a:r>
-              <a:rPr u="sng">
-                <a:solidFill>
-                  <a:schemeClr val="accent5"/>
-                </a:solidFill>
-                <a:uFill>
-                  <a:solidFill>
-                    <a:schemeClr val="accent5"/>
-                  </a:solidFill>
-                </a:uFill>
-                <a:hlinkClick r:id="rId3" invalidUrl="" action="" tgtFrame="" tooltip="" history="1" highlightClick="0" endSnd="0"/>
-              </a:rPr>
-              <a:t> </a:t>
-            </a:r>
-            <a:r>
-              <a:rPr u="sng">
-                <a:solidFill>
-                  <a:schemeClr val="accent5"/>
-                </a:solidFill>
-                <a:uFill>
-                  <a:solidFill>
-                    <a:schemeClr val="accent5"/>
-                  </a:solidFill>
-                </a:uFill>
-                <a:hlinkClick r:id="rId3" invalidUrl="" action="" tgtFrame="" tooltip="" history="1" highlightClick="0" endSnd="0"/>
-              </a:rPr>
-              <a:t>logged and assigned in Jira</a:t>
-            </a:r>
-            <a:r>
-              <a:t>, and everyone gets to work. After a week, we check in with one another to see if there are blockers or to onboard new fellows and catch them up. We then write about the work or create demos, so that the greater community can actively contribute or generally stay up to date with the project.</a:t>
-            </a:r>
-            <a:r>
-              <a:rPr u="sng">
-                <a:solidFill>
-                  <a:schemeClr val="accent5"/>
-                </a:solidFill>
-                <a:uFill>
-                  <a:solidFill>
-                    <a:schemeClr val="accent5"/>
-                  </a:solidFill>
-                </a:uFill>
-                <a:hlinkClick r:id="rId4" invalidUrl="" action="" tgtFrame="" tooltip="" history="1" highlightClick="0" endSnd="0"/>
-              </a:rPr>
-              <a:t> </a:t>
-            </a:r>
-            <a:r>
-              <a:rPr u="sng">
-                <a:solidFill>
-                  <a:schemeClr val="accent5"/>
-                </a:solidFill>
-                <a:uFill>
-                  <a:solidFill>
-                    <a:schemeClr val="accent5"/>
-                  </a:solidFill>
-                </a:uFill>
-                <a:hlinkClick r:id="rId4" invalidUrl="" action="" tgtFrame="" tooltip="" history="1" highlightClick="0" endSnd="0"/>
-              </a:rPr>
-              <a:t>This document</a:t>
-            </a:r>
-            <a:r>
-              <a:t> includes more detailed documentation on each individual step of this process.</a:t>
+              <a:t>Having a corner of the web you control so you can publish your outputs. </a:t>
             </a:r>
           </a:p>
         </p:txBody>
@@ -826,7 +967,7 @@
       </p:grpSpPr>
       <p:sp>
         <p:nvSpPr>
-          <p:cNvPr id="200" name="Shape 200"/>
+          <p:cNvPr id="199" name="Shape 199"/>
           <p:cNvSpPr/>
           <p:nvPr>
             <p:ph type="sldImg"/>
@@ -847,7 +988,154 @@
       </p:sp>
       <p:sp>
         <p:nvSpPr>
-          <p:cNvPr id="201" name="Shape 201"/>
+          <p:cNvPr id="200" name="Shape 200"/>
+          <p:cNvSpPr/>
+          <p:nvPr>
+            <p:ph type="body" sz="quarter" idx="1"/>
+          </p:nvPr>
+        </p:nvSpPr>
+        <p:spPr>
+          <a:prstGeom prst="rect">
+            <a:avLst/>
+          </a:prstGeom>
+        </p:spPr>
+        <p:txBody>
+          <a:bodyPr/>
+          <a:lstStyle/>
+          <a:p>
+            <a:pPr>
+              <a:defRPr sz="1100"/>
+            </a:pPr>
+            <a:r>
+              <a:t>Since open is inherently about making sure that people have agency, the project management needs to be designed in a way that coordinates people but gives them freedom.</a:t>
+            </a:r>
+          </a:p>
+          <a:p>
+            <a:pPr>
+              <a:defRPr sz="1100"/>
+            </a:pPr>
+          </a:p>
+          <a:p>
+            <a:pPr>
+              <a:defRPr sz="1100"/>
+            </a:pPr>
+            <a:r>
+              <a:t>Every two weeks, the Planet 4 team comes together to define high level, achievable goals for the sprint. Subteams then refine those goals into specific tasks based on their areas of focus. Once agreed, tasks are</a:t>
+            </a:r>
+            <a:r>
+              <a:rPr u="sng">
+                <a:solidFill>
+                  <a:srgbClr val="0000FF"/>
+                </a:solidFill>
+                <a:uFill>
+                  <a:solidFill>
+                    <a:srgbClr val="0000FF"/>
+                  </a:solidFill>
+                </a:uFill>
+                <a:hlinkClick r:id="rId3" invalidUrl="" action="" tgtFrame="" tooltip="" history="1" highlightClick="0" endSnd="0"/>
+              </a:rPr>
+              <a:t> </a:t>
+            </a:r>
+            <a:r>
+              <a:rPr u="sng">
+                <a:solidFill>
+                  <a:srgbClr val="0000FF"/>
+                </a:solidFill>
+                <a:uFill>
+                  <a:solidFill>
+                    <a:srgbClr val="0000FF"/>
+                  </a:solidFill>
+                </a:uFill>
+                <a:hlinkClick r:id="rId3" invalidUrl="" action="" tgtFrame="" tooltip="" history="1" highlightClick="0" endSnd="0"/>
+              </a:rPr>
+              <a:t>logged and assigned in Jira</a:t>
+            </a:r>
+            <a:r>
+              <a:t>, and everyone gets to work. After a week, we check in with one another to see if there are blockers or to onboard new fellows and catch them up. We then write about the work or create demos, so that the greater community can actively contribute or generally stay up to date with the project.</a:t>
+            </a:r>
+            <a:r>
+              <a:rPr u="sng">
+                <a:solidFill>
+                  <a:srgbClr val="0000FF"/>
+                </a:solidFill>
+                <a:uFill>
+                  <a:solidFill>
+                    <a:srgbClr val="0000FF"/>
+                  </a:solidFill>
+                </a:uFill>
+                <a:hlinkClick r:id="rId4" invalidUrl="" action="" tgtFrame="" tooltip="" history="1" highlightClick="0" endSnd="0"/>
+              </a:rPr>
+              <a:t> </a:t>
+            </a:r>
+            <a:r>
+              <a:rPr u="sng">
+                <a:solidFill>
+                  <a:srgbClr val="0000FF"/>
+                </a:solidFill>
+                <a:uFill>
+                  <a:solidFill>
+                    <a:srgbClr val="0000FF"/>
+                  </a:solidFill>
+                </a:uFill>
+                <a:hlinkClick r:id="rId4" invalidUrl="" action="" tgtFrame="" tooltip="" history="1" highlightClick="0" endSnd="0"/>
+              </a:rPr>
+              <a:t>This document</a:t>
+            </a:r>
+            <a:r>
+              <a:t> includes more detailed documentation on each individual step of this process.</a:t>
+            </a:r>
+          </a:p>
+        </p:txBody>
+      </p:sp>
+    </p:spTree>
+  </p:cSld>
+  <p:clrMapOvr>
+    <a:masterClrMapping/>
+  </p:clrMapOvr>
+</p:notes>
+</file>
+
+<file path=ppt/notesSlides/notesSlide13.xml><?xml version="1.0" encoding="utf-8"?>
+<p:notes xmlns:a="http://schemas.openxmlformats.org/drawingml/2006/main" xmlns:r="http://schemas.openxmlformats.org/officeDocument/2006/relationships" xmlns:p="http://schemas.openxmlformats.org/presentationml/2006/main" showMasterSp="1" showMasterPhAnim="1">
+  <p:cSld>
+    <p:spTree>
+      <p:nvGrpSpPr>
+        <p:cNvPr id="1" name=""/>
+        <p:cNvGrpSpPr/>
+        <p:nvPr/>
+      </p:nvGrpSpPr>
+      <p:grpSpPr>
+        <a:xfrm>
+          <a:off x="0" y="0"/>
+          <a:ext cx="0" cy="0"/>
+          <a:chOff x="0" y="0"/>
+          <a:chExt cx="0" cy="0"/>
+        </a:xfrm>
+      </p:grpSpPr>
+      <p:sp>
+        <p:nvSpPr>
+          <p:cNvPr id="205" name="Shape 205"/>
+          <p:cNvSpPr/>
+          <p:nvPr>
+            <p:ph type="sldImg"/>
+          </p:nvPr>
+        </p:nvSpPr>
+        <p:spPr>
+          <a:prstGeom prst="rect">
+            <a:avLst/>
+          </a:prstGeom>
+        </p:spPr>
+        <p:txBody>
+          <a:bodyPr/>
+          <a:lstStyle/>
+          <a:p>
+            <a:pPr/>
+          </a:p>
+        </p:txBody>
+      </p:sp>
+      <p:sp>
+        <p:nvSpPr>
+          <p:cNvPr id="206" name="Shape 206"/>
           <p:cNvSpPr/>
           <p:nvPr>
             <p:ph type="body" sz="quarter" idx="1"/>
@@ -907,7 +1195,7 @@
       </p:grpSpPr>
       <p:sp>
         <p:nvSpPr>
-          <p:cNvPr id="135" name="Shape 135"/>
+          <p:cNvPr id="136" name="Shape 136"/>
           <p:cNvSpPr/>
           <p:nvPr>
             <p:ph type="sldImg"/>
@@ -928,7 +1216,7 @@
       </p:sp>
       <p:sp>
         <p:nvSpPr>
-          <p:cNvPr id="136" name="Shape 136"/>
+          <p:cNvPr id="137" name="Shape 137"/>
           <p:cNvSpPr/>
           <p:nvPr>
             <p:ph type="body" sz="quarter" idx="1"/>
@@ -941,23 +1229,36 @@
         </p:spPr>
         <p:txBody>
           <a:bodyPr/>
-          <a:lstStyle>
-            <a:lvl1pPr>
-              <a:lnSpc>
-                <a:spcPct val="115000"/>
-              </a:lnSpc>
-              <a:defRPr sz="1100">
-                <a:latin typeface="Open Sans"/>
-                <a:ea typeface="Open Sans"/>
-                <a:cs typeface="Open Sans"/>
-                <a:sym typeface="Open Sans"/>
-              </a:defRPr>
-            </a:lvl1pPr>
-          </a:lstStyle>
+          <a:lstStyle/>
           <a:p>
             <a:pPr/>
             <a:r>
-              <a:t>Let’s talk a little about the benefits of working openly, from a meta - philosophical level. Or in GP terms, from the mindset level.</a:t>
+              <a:t>“Open source”, open data, open education, open government, open food...“Open” isn’t just a fun buzzword, it started as a technological revolution and has evolved into a cultural movement. There are three main tenets of open.</a:t>
+            </a:r>
+          </a:p>
+          <a:p>
+            <a:pPr/>
+            <a:br/>
+            <a:r>
+              <a:t>Transparency: the culture of Open is one that is transparent about processes, creations and authors. We make media and write posts about our work. We ask questions and allow anyone to feedback on them through commenting and social media. We change things based on what our peers say, and we explain our decisions openly, so that everyone can see not only what we've done, but how and why. </a:t>
+            </a:r>
+          </a:p>
+          <a:p>
+            <a:pPr/>
+          </a:p>
+          <a:p>
+            <a:pPr/>
+            <a:r>
+              <a:t>Decentralization: The Open Web is made up of thousands of independent servers and webpages. The networked computers that make up the Internet are not owned by any single entity. Additionally, webpages are created and maintained by millions of people. Decentralization in the social and cultural space is inherent in anything “open”. Nothing is under a single authority. The themes, topics and materials a project addresses and creates aren’t created in a vacuum. They are created collaboratively. Peer to peer feedback and collective work runs the show. </a:t>
+            </a:r>
+          </a:p>
+          <a:p>
+            <a:pPr/>
+          </a:p>
+          <a:p>
+            <a:pPr/>
+            <a:r>
+              <a:t>Hackability and Innovation: Transparency and decentralization allow for hackability and innovation – Good ideas can come from anywhere. Open is a structure that makes remix and redistribution easy, the culture that lives by these tenets takes pride in extending, changing and reforming each other's work. Because we can see how things are built, we can change them and apply new meaning and context atop someone else's ideas. We start to have a conversation through production, and that is something that is supported by and encouraged through “open”</a:t>
             </a:r>
           </a:p>
         </p:txBody>
@@ -989,7 +1290,7 @@
       </p:grpSpPr>
       <p:sp>
         <p:nvSpPr>
-          <p:cNvPr id="143" name="Shape 143"/>
+          <p:cNvPr id="140" name="Shape 140"/>
           <p:cNvSpPr/>
           <p:nvPr>
             <p:ph type="sldImg"/>
@@ -1010,7 +1311,7 @@
       </p:sp>
       <p:sp>
         <p:nvSpPr>
-          <p:cNvPr id="144" name="Shape 144"/>
+          <p:cNvPr id="141" name="Shape 141"/>
           <p:cNvSpPr/>
           <p:nvPr>
             <p:ph type="body" sz="quarter" idx="1"/>
@@ -1023,106 +1324,23 @@
         </p:spPr>
         <p:txBody>
           <a:bodyPr/>
-          <a:lstStyle/>
-          <a:p>
-            <a:pPr>
-              <a:defRPr sz="1100"/>
-            </a:pPr>
-            <a:r>
-              <a:t>At Greenpeace, we’ve determined that we need to think differently than the status quo to make impact. We need to be innovative, fail forward, take more risks, and all that other stuff the Framework says. Part of transitioning to this new mode of being, mode of working is about </a:t>
-            </a:r>
-            <a:r>
-              <a:rPr>
+          <a:lstStyle>
+            <a:lvl1pPr>
+              <a:lnSpc>
+                <a:spcPct val="115000"/>
+              </a:lnSpc>
+              <a:defRPr sz="1100">
                 <a:latin typeface="Open Sans"/>
                 <a:ea typeface="Open Sans"/>
                 <a:cs typeface="Open Sans"/>
                 <a:sym typeface="Open Sans"/>
-              </a:rPr>
-              <a:t>overcoming aspects of our identities and emotions that we’ve had instilled upon us. We have to reflect on and give tribute to the social and cultural norms that define us. </a:t>
-            </a:r>
-          </a:p>
-          <a:p>
-            <a:pPr>
-              <a:defRPr sz="1100"/>
-            </a:pPr>
-            <a:endParaRPr>
-              <a:latin typeface="Open Sans"/>
-              <a:ea typeface="Open Sans"/>
-              <a:cs typeface="Open Sans"/>
-              <a:sym typeface="Open Sans"/>
-            </a:endParaRPr>
-          </a:p>
-          <a:p>
-            <a:pPr>
-              <a:defRPr sz="1100"/>
-            </a:pPr>
-            <a:r>
-              <a:t>Our emotional legacy is influenced by surroundings and norms, so what keeps us from truly participating 100% of the time is fear and the social and cultural norms we’ve been taught are rules in civil discourse and social behavior. We’ve been taught that that the speaker is notable, that the CEO has vision, that the teacher is the expert, that the police maintain control, that respect means being quiet and letting others have the floor. We’ve been taught what “right” in social situations is.</a:t>
-            </a:r>
-          </a:p>
-          <a:p>
-            <a:pPr>
-              <a:defRPr sz="1100"/>
-            </a:pPr>
-          </a:p>
-          <a:p>
-            <a:pPr>
-              <a:defRPr sz="1100"/>
-            </a:pPr>
-            <a:r>
-              <a:t>But all of that is a collective perception that has roots.</a:t>
-            </a:r>
-          </a:p>
-          <a:p>
-            <a:pPr>
-              <a:defRPr sz="1100"/>
-            </a:pPr>
-          </a:p>
-          <a:p>
-            <a:pPr>
-              <a:defRPr sz="1100"/>
-            </a:pPr>
-            <a:r>
-              <a:t>With the invention of the web, we’re much quicker to learn histories and contexts, relationships and influences that we didn’t know about before. Our ability to connect, allows us to talk about social norms and push back at common public perceptions.</a:t>
-            </a:r>
-          </a:p>
-          <a:p>
-            <a:pPr>
-              <a:defRPr sz="1100"/>
-            </a:pPr>
-          </a:p>
-          <a:p>
-            <a:pPr>
-              <a:defRPr sz="1100"/>
-            </a:pPr>
-            <a:r>
-              <a:t>This is beginning to bleed into the real world in fascinating ways. We’ve been taught a certain degree of distrust, but much of the open community is adopting views around the way we interact with each other. There are communities who are putting trust at the center of how they operate.</a:t>
-            </a:r>
-          </a:p>
-          <a:p>
-            <a:pPr>
-              <a:defRPr sz="1100"/>
-            </a:pPr>
-          </a:p>
-          <a:p>
-            <a:pPr>
-              <a:defRPr sz="1100"/>
-            </a:pPr>
-            <a:r>
-              <a:t>Views like “Everyone’s voice matters” or “There are no stupid questions”. Simple, humanistic points of view that are directly related to how we as human beings participate in the world and govern our lives.</a:t>
-            </a:r>
-          </a:p>
-          <a:p>
-            <a:pPr>
-              <a:defRPr sz="1100"/>
-            </a:pPr>
-          </a:p>
-          <a:p>
-            <a:pPr>
-              <a:defRPr sz="1100"/>
-            </a:pPr>
-            <a:r>
-              <a:t>In business, this is changing entire power structures and dynamics.</a:t>
+              </a:defRPr>
+            </a:lvl1pPr>
+          </a:lstStyle>
+          <a:p>
+            <a:pPr/>
+            <a:r>
+              <a:t>Let’s talk a little about the benefits of working openly, from a meta - philosophical level. Or in GP terms, from the mindset level.</a:t>
             </a:r>
           </a:p>
         </p:txBody>
@@ -1194,33 +1412,99 @@
               <a:defRPr sz="1100"/>
             </a:pPr>
             <a:r>
-              <a:t>Ok, now that we have the behaviors bit out of the way, let’s talk about it more practically. Putting everyone on the same level and giving everyone agency and promoting open collaboration is a terrifying prospect, especially in business. It’s a pretty unnatural feeling. And it’s a pretty impossible feeling to feel, all the time, that we are worthy of having voice.</a:t>
-            </a:r>
+              <a:t>At Greenpeace, we’ve determined that we need to think differently than the status quo to make impact. We need to be innovative, fail forward, take more risks, and all that other stuff the Framework says. Part of transitioning to this new mode of being, mode of working is about </a:t>
+            </a:r>
+            <a:r>
+              <a:rPr>
+                <a:latin typeface="Open Sans"/>
+                <a:ea typeface="Open Sans"/>
+                <a:cs typeface="Open Sans"/>
+                <a:sym typeface="Open Sans"/>
+              </a:rPr>
+              <a:t>overcoming aspects of our identities and emotions that we’ve had instilled upon us. We have to reflect on and give tribute to the social and cultural norms that define us. </a:t>
+            </a:r>
+          </a:p>
+          <a:p>
+            <a:pPr>
+              <a:defRPr sz="1100">
+                <a:latin typeface="Open Sans"/>
+                <a:ea typeface="Open Sans"/>
+                <a:cs typeface="Open Sans"/>
+                <a:sym typeface="Open Sans"/>
+              </a:defRPr>
+            </a:pPr>
           </a:p>
           <a:p>
             <a:pPr>
               <a:defRPr sz="1100"/>
             </a:pPr>
+            <a:r>
+              <a:t>Our emotional legacy is influenced by surroundings and norms, so what keeps us from truly participating 100% of the time is fear and the social and cultural norms we’ve been taught are rules in civil discourse and social behavior. We’ve been taught that that the speaker is notable, that the CEO has vision, that the teacher is the expert, that the police maintain control, that respect means being quiet and letting others have the floor. We’ve been taught what “right” in social situations is.</a:t>
+            </a:r>
           </a:p>
           <a:p>
             <a:pPr>
               <a:defRPr sz="1100"/>
             </a:pPr>
-            <a:r>
-              <a:t>We are groomed to understand hierarchies, authorities and seniorities. An agile management structure allows the person most capable of a particular job to manage that bit of the project in a way that makes sense to them. This is critical because we don’t all think the same way.</a:t>
-            </a:r>
           </a:p>
           <a:p>
             <a:pPr>
               <a:defRPr sz="1100"/>
             </a:pPr>
+            <a:r>
+              <a:t>But all of that is a collective perception that has roots.</a:t>
+            </a:r>
           </a:p>
           <a:p>
             <a:pPr>
               <a:defRPr sz="1100"/>
             </a:pPr>
-            <a:r>
-              <a:t>Let’s look at Planet 4 through this lens, yeah?</a:t>
+          </a:p>
+          <a:p>
+            <a:pPr>
+              <a:defRPr sz="1100"/>
+            </a:pPr>
+            <a:r>
+              <a:t>With the invention of the web, we’re much quicker to learn histories and contexts, relationships and influences that we didn’t know about before. Our ability to connect, allows us to talk about social norms and push back at common public perceptions.</a:t>
+            </a:r>
+          </a:p>
+          <a:p>
+            <a:pPr>
+              <a:defRPr sz="1100"/>
+            </a:pPr>
+          </a:p>
+          <a:p>
+            <a:pPr>
+              <a:defRPr sz="1100"/>
+            </a:pPr>
+            <a:r>
+              <a:t>This is beginning to bleed into the real world in fascinating ways. We’ve been taught a certain degree of distrust, but much of the open community is adopting views around the way we interact with each other. There are communities who are putting trust at the center of how they operate.</a:t>
+            </a:r>
+          </a:p>
+          <a:p>
+            <a:pPr>
+              <a:defRPr sz="1100"/>
+            </a:pPr>
+          </a:p>
+          <a:p>
+            <a:pPr>
+              <a:defRPr sz="1100"/>
+            </a:pPr>
+            <a:r>
+              <a:t>Views like “Everyone’s voice matters” or “There are no stupid questions”. Simple, humanistic points of view that are directly related to how we as human beings participate in the world and govern our lives.</a:t>
+            </a:r>
+          </a:p>
+          <a:p>
+            <a:pPr>
+              <a:defRPr sz="1100"/>
+            </a:pPr>
+          </a:p>
+          <a:p>
+            <a:pPr>
+              <a:defRPr sz="1100"/>
+            </a:pPr>
+            <a:r>
+              <a:t>In business, this is changing entire power structures and dynamics.</a:t>
             </a:r>
           </a:p>
         </p:txBody>
@@ -1292,7 +1576,7 @@
               <a:defRPr sz="1100"/>
             </a:pPr>
             <a:r>
-              <a:t>Left is the tech team, up top is Support and Comms, to the right Design and in the middle the PM team. The 6 people in the PM team coordinate their pieces and parts. We work together to coordinate each other.</a:t>
+              <a:t>Ok, now that we have the behaviors bit out of the way, let’s talk about it more practically. Putting everyone on the same level and giving everyone agency and promoting open collaboration is a terrifying prospect, especially in business. It’s a pretty unnatural feeling. And it’s a pretty impossible feeling to feel, all the time, that we are worthy of having voice.</a:t>
             </a:r>
           </a:p>
           <a:p>
@@ -1305,13 +1589,21 @@
               <a:defRPr sz="1100"/>
             </a:pPr>
             <a:r>
-              <a:t>This structure might look confusing, but it’s what makes innovation possible. We are all responsible. We are all accountable.</a:t>
+              <a:t>We are groomed to understand hierarchies, authorities and seniorities. An agile management structure allows the person most capable of a particular job to manage that bit of the project in a way that makes sense to them. This is critical because we don’t all think the same way.</a:t>
             </a:r>
           </a:p>
           <a:p>
             <a:pPr>
               <a:defRPr sz="1100"/>
             </a:pPr>
+          </a:p>
+          <a:p>
+            <a:pPr>
+              <a:defRPr sz="1100"/>
+            </a:pPr>
+            <a:r>
+              <a:t>Let’s look at Planet 4 through this lens, yeah?</a:t>
+            </a:r>
           </a:p>
         </p:txBody>
       </p:sp>
@@ -1342,7 +1634,7 @@
       </p:grpSpPr>
       <p:sp>
         <p:nvSpPr>
-          <p:cNvPr id="157" name="Shape 157"/>
+          <p:cNvPr id="158" name="Shape 158"/>
           <p:cNvSpPr/>
           <p:nvPr>
             <p:ph type="sldImg"/>
@@ -1363,7 +1655,7 @@
       </p:sp>
       <p:sp>
         <p:nvSpPr>
-          <p:cNvPr id="158" name="Shape 158"/>
+          <p:cNvPr id="159" name="Shape 159"/>
           <p:cNvSpPr/>
           <p:nvPr>
             <p:ph type="body" sz="quarter" idx="1"/>
@@ -1379,33 +1671,24 @@
           <a:lstStyle/>
           <a:p>
             <a:pPr>
-              <a:lnSpc>
-                <a:spcPct val="115000"/>
-              </a:lnSpc>
-              <a:defRPr sz="1100">
-                <a:latin typeface="Open Sans"/>
-                <a:ea typeface="Open Sans"/>
-                <a:cs typeface="Open Sans"/>
-                <a:sym typeface="Open Sans"/>
-              </a:defRPr>
-            </a:pPr>
-            <a:r>
-              <a:t> I explain "participatory" as the difference between a lecture and a conversation. It's the difference between passive and active. Centering on people’s interests and facilitating connections helps people produce something is valuable for their community. Their personal and professional development hangs on the feeling of connection. Humans live for connection, we physically need it.</a:t>
-            </a:r>
-          </a:p>
-          <a:p>
-            <a:pPr>
-              <a:lnSpc>
-                <a:spcPct val="115000"/>
-              </a:lnSpc>
               <a:defRPr sz="1100"/>
             </a:pPr>
-            <a:endParaRPr>
-              <a:latin typeface="Open Sans"/>
-              <a:ea typeface="Open Sans"/>
-              <a:cs typeface="Open Sans"/>
-              <a:sym typeface="Open Sans"/>
-            </a:endParaRPr>
+            <a:r>
+              <a:t>Left is the tech team, up top is Support and Comms, to the right Design and in the middle the PM team. The 6 people in the PM team coordinate their pieces and parts. We work together to coordinate each other.</a:t>
+            </a:r>
+          </a:p>
+          <a:p>
+            <a:pPr>
+              <a:defRPr sz="1100"/>
+            </a:pPr>
+          </a:p>
+          <a:p>
+            <a:pPr>
+              <a:defRPr sz="1100"/>
+            </a:pPr>
+            <a:r>
+              <a:t>This structure might look confusing, but it’s what makes innovation possible. We are all responsible. We are all accountable.</a:t>
+            </a:r>
           </a:p>
         </p:txBody>
       </p:sp>
@@ -1436,7 +1719,7 @@
       </p:grpSpPr>
       <p:sp>
         <p:nvSpPr>
-          <p:cNvPr id="163" name="Shape 163"/>
+          <p:cNvPr id="162" name="Shape 162"/>
           <p:cNvSpPr/>
           <p:nvPr>
             <p:ph type="sldImg"/>
@@ -1457,7 +1740,7 @@
       </p:sp>
       <p:sp>
         <p:nvSpPr>
-          <p:cNvPr id="164" name="Shape 164"/>
+          <p:cNvPr id="163" name="Shape 163"/>
           <p:cNvSpPr/>
           <p:nvPr>
             <p:ph type="body" sz="quarter" idx="1"/>
@@ -1470,9 +1753,8 @@
         </p:spPr>
         <p:txBody>
           <a:bodyPr/>
-          <a:lstStyle/>
-          <a:p>
-            <a:pPr>
+          <a:lstStyle>
+            <a:lvl1pPr>
               <a:lnSpc>
                 <a:spcPct val="115000"/>
               </a:lnSpc>
@@ -1482,101 +1764,12 @@
                 <a:cs typeface="Open Sans"/>
                 <a:sym typeface="Open Sans"/>
               </a:defRPr>
-            </a:pPr>
-            <a:r>
-              <a:t>So people who believe in open strive to design projects to be participatory and collaborative by creating structures where roles are shifted.</a:t>
-            </a:r>
-          </a:p>
-          <a:p>
-            <a:pPr>
-              <a:lnSpc>
-                <a:spcPct val="115000"/>
-              </a:lnSpc>
-              <a:defRPr sz="1100"/>
-            </a:pPr>
-            <a:endParaRPr>
-              <a:latin typeface="Open Sans"/>
-              <a:ea typeface="Open Sans"/>
-              <a:cs typeface="Open Sans"/>
-              <a:sym typeface="Open Sans"/>
-            </a:endParaRPr>
-          </a:p>
-          <a:p>
-            <a:pPr>
-              <a:lnSpc>
-                <a:spcPct val="115000"/>
-              </a:lnSpc>
-              <a:defRPr sz="1100">
-                <a:latin typeface="Open Sans"/>
-                <a:ea typeface="Open Sans"/>
-                <a:cs typeface="Open Sans"/>
-                <a:sym typeface="Open Sans"/>
-              </a:defRPr>
-            </a:pPr>
-            <a:r>
-              <a:t>There are many simple techniques that help people have agency. My top 3 are super simple:</a:t>
-            </a:r>
-          </a:p>
-          <a:p>
-            <a:pPr>
-              <a:lnSpc>
-                <a:spcPct val="115000"/>
-              </a:lnSpc>
-              <a:defRPr sz="1100"/>
-            </a:pPr>
-            <a:endParaRPr>
-              <a:latin typeface="Open Sans"/>
-              <a:ea typeface="Open Sans"/>
-              <a:cs typeface="Open Sans"/>
-              <a:sym typeface="Open Sans"/>
-            </a:endParaRPr>
-          </a:p>
-          <a:p>
-            <a:pPr>
-              <a:lnSpc>
-                <a:spcPct val="115000"/>
-              </a:lnSpc>
-              <a:defRPr sz="1100">
-                <a:latin typeface="Open Sans"/>
-                <a:ea typeface="Open Sans"/>
-                <a:cs typeface="Open Sans"/>
-                <a:sym typeface="Open Sans"/>
-              </a:defRPr>
-            </a:pPr>
-            <a:r>
-              <a:t>Community Calls. Here’s a guide, this is long term trust building.</a:t>
-            </a:r>
-          </a:p>
-          <a:p>
-            <a:pPr>
-              <a:lnSpc>
-                <a:spcPct val="115000"/>
-              </a:lnSpc>
-              <a:defRPr sz="1100">
-                <a:latin typeface="Open Sans"/>
-                <a:ea typeface="Open Sans"/>
-                <a:cs typeface="Open Sans"/>
-                <a:sym typeface="Open Sans"/>
-              </a:defRPr>
-            </a:pPr>
-            <a:r>
-              <a:t>Individual outreach. It’s so easy to say please and thank you.</a:t>
-            </a:r>
-          </a:p>
-          <a:p>
-            <a:pPr>
-              <a:lnSpc>
-                <a:spcPct val="115000"/>
-              </a:lnSpc>
-              <a:defRPr sz="1100">
-                <a:latin typeface="Open Sans"/>
-                <a:ea typeface="Open Sans"/>
-                <a:cs typeface="Open Sans"/>
-                <a:sym typeface="Open Sans"/>
-              </a:defRPr>
-            </a:pPr>
-            <a:r>
-              <a:t>Listening. Amazing what you hear if you learn to listen well.</a:t>
+            </a:lvl1pPr>
+          </a:lstStyle>
+          <a:p>
+            <a:pPr/>
+            <a:r>
+              <a:t> I explain "participatory" as the difference between a lecture and a conversation. It's the difference between passive and active. Centering on people’s interests and facilitating connections helps people produce something is valuable for their community. Their personal and professional development hangs on the feeling of connection. Humans live for connection, we physically need it.</a:t>
             </a:r>
           </a:p>
         </p:txBody>
@@ -1608,7 +1801,7 @@
       </p:grpSpPr>
       <p:sp>
         <p:nvSpPr>
-          <p:cNvPr id="180" name="Shape 180"/>
+          <p:cNvPr id="179" name="Shape 179"/>
           <p:cNvSpPr/>
           <p:nvPr>
             <p:ph type="sldImg"/>
@@ -1629,7 +1822,7 @@
       </p:sp>
       <p:sp>
         <p:nvSpPr>
-          <p:cNvPr id="181" name="Shape 181"/>
+          <p:cNvPr id="180" name="Shape 180"/>
           <p:cNvSpPr/>
           <p:nvPr>
             <p:ph type="body" sz="quarter" idx="1"/>
@@ -1654,9 +1847,8 @@
           </a:p>
           <a:p>
             <a:pPr>
-              <a:defRPr sz="1100"/>
+              <a:defRPr sz="1200"/>
             </a:pPr>
-            <a:endParaRPr sz="1200"/>
           </a:p>
           <a:p>
             <a:pPr>
@@ -1727,7 +1919,7 @@
       </p:grpSpPr>
       <p:sp>
         <p:nvSpPr>
-          <p:cNvPr id="184" name="Shape 184"/>
+          <p:cNvPr id="185" name="Shape 185"/>
           <p:cNvSpPr/>
           <p:nvPr>
             <p:ph type="sldImg"/>
@@ -1748,7 +1940,7 @@
       </p:sp>
       <p:sp>
         <p:nvSpPr>
-          <p:cNvPr id="185" name="Shape 185"/>
+          <p:cNvPr id="186" name="Shape 186"/>
           <p:cNvSpPr/>
           <p:nvPr>
             <p:ph type="body" sz="quarter" idx="1"/>
@@ -1775,7 +1967,7 @@
               </a:defRPr>
             </a:pPr>
             <a:r>
-              <a:t>How does this work? Practically?</a:t>
+              <a:t>So people who believe in open strive to design projects to be participatory and collaborative by creating structures where roles are shifted.</a:t>
             </a:r>
           </a:p>
           <a:p>
@@ -1804,26 +1996,8 @@
               </a:defRPr>
             </a:pPr>
             <a:r>
-              <a:rPr b="1"/>
-              <a:t>Every project team is different, so you need to work together to define which structures work for your team. This is a negotiation</a:t>
-            </a:r>
-            <a:r>
-              <a:t> because our brains function differently. In an open project it’s massively important to think about how transparency, decentralization and hackability are represented in your management structures. </a:t>
-            </a:r>
-          </a:p>
-          <a:p>
-            <a:pPr>
-              <a:lnSpc>
-                <a:spcPct val="115000"/>
-              </a:lnSpc>
-              <a:defRPr sz="1100"/>
-            </a:pPr>
-            <a:endParaRPr>
-              <a:latin typeface="Open Sans"/>
-              <a:ea typeface="Open Sans"/>
-              <a:cs typeface="Open Sans"/>
-              <a:sym typeface="Open Sans"/>
-            </a:endParaRPr>
+              <a:t>There are many simple techniques that help people have agency. My top 3 are super simple:</a:t>
+            </a:r>
           </a:p>
           <a:p>
             <a:pPr>
@@ -1837,23 +2011,6 @@
                 <a:sym typeface="Open Sans"/>
               </a:defRPr>
             </a:pPr>
-            <a:r>
-              <a:t>The Planet 4 team negotiated over months. Not days. We made decisions as we went, changed our minds, and went through the process of getting to know how each individual works. We made compromises to each other. </a:t>
-            </a:r>
-          </a:p>
-          <a:p>
-            <a:pPr>
-              <a:lnSpc>
-                <a:spcPct val="115000"/>
-              </a:lnSpc>
-              <a:defRPr sz="1100"/>
-            </a:pPr>
-            <a:endParaRPr>
-              <a:latin typeface="Open Sans"/>
-              <a:ea typeface="Open Sans"/>
-              <a:cs typeface="Open Sans"/>
-              <a:sym typeface="Open Sans"/>
-            </a:endParaRPr>
           </a:p>
           <a:p>
             <a:pPr>
@@ -1868,22 +2025,8 @@
               </a:defRPr>
             </a:pPr>
             <a:r>
-              <a:t>I urge colleagues to publish links to every document, image, bug and product to get them thinking about open practices through practice. Giving people agency is the reason I serve as a model regardless of perceived power dynamics. This has gotten me into loads of trouble, but modeling the behaviors you want to see in the world is the only way you can adequately affect change.</a:t>
-            </a:r>
-          </a:p>
-          <a:p>
-            <a:pPr>
-              <a:lnSpc>
-                <a:spcPct val="115000"/>
-              </a:lnSpc>
-              <a:defRPr sz="1100"/>
-            </a:pPr>
-            <a:endParaRPr>
-              <a:latin typeface="Open Sans"/>
-              <a:ea typeface="Open Sans"/>
-              <a:cs typeface="Open Sans"/>
-              <a:sym typeface="Open Sans"/>
-            </a:endParaRPr>
+              <a:t>Community Calls. Here’s a guide, this is long term trust building.</a:t>
+            </a:r>
           </a:p>
           <a:p>
             <a:pPr>
@@ -1898,22 +2041,8 @@
               </a:defRPr>
             </a:pPr>
             <a:r>
-              <a:t>I organize my own work around the idea that other people can participate. I set up systems that they can use. I adjust to their technical and social skill level.</a:t>
-            </a:r>
-          </a:p>
-          <a:p>
-            <a:pPr>
-              <a:lnSpc>
-                <a:spcPct val="115000"/>
-              </a:lnSpc>
-              <a:defRPr sz="1100"/>
-            </a:pPr>
-            <a:endParaRPr>
-              <a:latin typeface="Open Sans"/>
-              <a:ea typeface="Open Sans"/>
-              <a:cs typeface="Open Sans"/>
-              <a:sym typeface="Open Sans"/>
-            </a:endParaRPr>
+              <a:t>Individual outreach. It’s so easy to say please and thank you.</a:t>
+            </a:r>
           </a:p>
           <a:p>
             <a:pPr>
@@ -1928,67 +2057,7 @@
               </a:defRPr>
             </a:pPr>
             <a:r>
-              <a:t>I believe that together we are smarter. Participation is key for any organization looking to change the world, so getting people to trust in best intentions again is part of making the world a better place.</a:t>
-            </a:r>
-          </a:p>
-          <a:p>
-            <a:pPr>
-              <a:lnSpc>
-                <a:spcPct val="115000"/>
-              </a:lnSpc>
-              <a:defRPr sz="1100"/>
-            </a:pPr>
-            <a:endParaRPr>
-              <a:latin typeface="Open Sans"/>
-              <a:ea typeface="Open Sans"/>
-              <a:cs typeface="Open Sans"/>
-              <a:sym typeface="Open Sans"/>
-            </a:endParaRPr>
-          </a:p>
-          <a:p>
-            <a:pPr>
-              <a:lnSpc>
-                <a:spcPct val="115000"/>
-              </a:lnSpc>
-              <a:defRPr sz="1100">
-                <a:latin typeface="Open Sans"/>
-                <a:ea typeface="Open Sans"/>
-                <a:cs typeface="Open Sans"/>
-                <a:sym typeface="Open Sans"/>
-              </a:defRPr>
-            </a:pPr>
-            <a:r>
-              <a:t>Shifting the behaviors and mindsets of “everyone”, which, by the way is every non-profits target audience, means that we need the input and understanding of “everyone”. We have to stop pretending like we can save the planet without the “masses”.</a:t>
-            </a:r>
-          </a:p>
-          <a:p>
-            <a:pPr>
-              <a:lnSpc>
-                <a:spcPct val="115000"/>
-              </a:lnSpc>
-              <a:defRPr sz="1100"/>
-            </a:pPr>
-            <a:endParaRPr>
-              <a:latin typeface="Open Sans"/>
-              <a:ea typeface="Open Sans"/>
-              <a:cs typeface="Open Sans"/>
-              <a:sym typeface="Open Sans"/>
-            </a:endParaRPr>
-          </a:p>
-          <a:p>
-            <a:pPr>
-              <a:lnSpc>
-                <a:spcPct val="115000"/>
-              </a:lnSpc>
-              <a:defRPr sz="1100">
-                <a:latin typeface="Open Sans"/>
-                <a:ea typeface="Open Sans"/>
-                <a:cs typeface="Open Sans"/>
-                <a:sym typeface="Open Sans"/>
-              </a:defRPr>
-            </a:pPr>
-            <a:r>
-              <a:t>I’ve learned that you have to help people understand why their participation is necessary and create systems that make participation easy. You have to help people understand what you’re working on, and you have to respect peoples contributions. Most importantly, you have to model the behaviors you want to see in the world.</a:t>
+              <a:t>Listening. Amazing what you hear if you learn to listen well.</a:t>
             </a:r>
           </a:p>
         </p:txBody>
@@ -2028,8 +2097,8 @@
         </p:nvSpPr>
         <p:spPr>
           <a:xfrm>
-            <a:off x="311708" y="744574"/>
-            <a:ext cx="8520601" cy="2052601"/>
+            <a:off x="311708" y="744573"/>
+            <a:ext cx="8520601" cy="2052603"/>
           </a:xfrm>
           <a:prstGeom prst="rect">
             <a:avLst/>
@@ -2068,8 +2137,8 @@
         </p:nvSpPr>
         <p:spPr>
           <a:xfrm>
-            <a:off x="311699" y="2834125"/>
-            <a:ext cx="8520602" cy="792601"/>
+            <a:off x="311698" y="2834125"/>
+            <a:ext cx="8520603" cy="792602"/>
           </a:xfrm>
           <a:prstGeom prst="rect">
             <a:avLst/>
@@ -2254,8 +2323,8 @@
         </p:nvSpPr>
         <p:spPr>
           <a:xfrm>
-            <a:off x="311699" y="1106125"/>
-            <a:ext cx="8520602" cy="1963500"/>
+            <a:off x="311698" y="1106125"/>
+            <a:ext cx="8520603" cy="1963500"/>
           </a:xfrm>
           <a:prstGeom prst="rect">
             <a:avLst/>
@@ -2286,8 +2355,8 @@
         </p:nvSpPr>
         <p:spPr>
           <a:xfrm>
-            <a:off x="311699" y="3152225"/>
-            <a:ext cx="8520602" cy="1300800"/>
+            <a:off x="311698" y="3152225"/>
+            <a:ext cx="8520603" cy="1300800"/>
           </a:xfrm>
           <a:prstGeom prst="rect">
             <a:avLst/>
@@ -2449,7 +2518,7 @@
         <p:spPr>
           <a:xfrm>
             <a:off x="0" y="1296590"/>
-            <a:ext cx="9144000" cy="3857701"/>
+            <a:ext cx="9144000" cy="3857702"/>
           </a:xfrm>
           <a:prstGeom prst="rect">
             <a:avLst/>
@@ -2470,7 +2539,7 @@
         <p:spPr>
           <a:xfrm>
             <a:off x="0" y="0"/>
-            <a:ext cx="358373" cy="350622"/>
+            <a:ext cx="358371" cy="350620"/>
           </a:xfrm>
           <a:prstGeom prst="rect">
             <a:avLst/>
@@ -2532,8 +2601,8 @@
         </p:nvSpPr>
         <p:spPr>
           <a:xfrm>
-            <a:off x="311699" y="2150849"/>
-            <a:ext cx="8520602" cy="841801"/>
+            <a:off x="311698" y="2150848"/>
+            <a:ext cx="8520603" cy="841802"/>
           </a:xfrm>
           <a:prstGeom prst="rect">
             <a:avLst/>
@@ -2756,8 +2825,8 @@
         </p:nvSpPr>
         <p:spPr>
           <a:xfrm>
-            <a:off x="311699" y="1152475"/>
-            <a:ext cx="3999902" cy="3416400"/>
+            <a:off x="311698" y="1152475"/>
+            <a:ext cx="3999903" cy="3416400"/>
           </a:xfrm>
           <a:prstGeom prst="rect">
             <a:avLst/>
@@ -2824,8 +2893,8 @@
         </p:nvSpPr>
         <p:spPr>
           <a:xfrm>
-            <a:off x="4832399" y="1152475"/>
-            <a:ext cx="3999902" cy="3416400"/>
+            <a:off x="4832398" y="1152475"/>
+            <a:ext cx="3999903" cy="3416400"/>
           </a:xfrm>
           <a:prstGeom prst="rect">
             <a:avLst/>
@@ -2835,9 +2904,7 @@
           <a:bodyPr/>
           <a:lstStyle/>
           <a:p>
-            <a:pPr>
-              <a:defRPr sz="1400"/>
-            </a:pPr>
+            <a:pPr/>
           </a:p>
         </p:txBody>
       </p:sp>
@@ -2971,8 +3038,8 @@
         </p:nvSpPr>
         <p:spPr>
           <a:xfrm>
-            <a:off x="311699" y="555600"/>
-            <a:ext cx="2808001" cy="755700"/>
+            <a:off x="311698" y="555600"/>
+            <a:ext cx="2808003" cy="755700"/>
           </a:xfrm>
           <a:prstGeom prst="rect">
             <a:avLst/>
@@ -3003,8 +3070,8 @@
         </p:nvSpPr>
         <p:spPr>
           <a:xfrm>
-            <a:off x="311699" y="1389599"/>
-            <a:ext cx="2808001" cy="3179401"/>
+            <a:off x="311698" y="1389598"/>
+            <a:ext cx="2808003" cy="3179403"/>
           </a:xfrm>
           <a:prstGeom prst="rect">
             <a:avLst/>
@@ -3119,8 +3186,8 @@
         </p:nvSpPr>
         <p:spPr>
           <a:xfrm>
-            <a:off x="490250" y="450149"/>
-            <a:ext cx="6367801" cy="4090801"/>
+            <a:off x="490250" y="450148"/>
+            <a:ext cx="6367801" cy="4090803"/>
           </a:xfrm>
           <a:prstGeom prst="rect">
             <a:avLst/>
@@ -3197,8 +3264,8 @@
         </p:nvSpPr>
         <p:spPr>
           <a:xfrm>
-            <a:off x="4572000" y="-125"/>
-            <a:ext cx="4572000" cy="5143501"/>
+            <a:off x="4572000" y="-126"/>
+            <a:ext cx="4572000" cy="5143503"/>
           </a:xfrm>
           <a:prstGeom prst="rect">
             <a:avLst/>
@@ -3211,10 +3278,17 @@
           </a:ln>
         </p:spPr>
         <p:txBody>
-          <a:bodyPr lIns="45719" rIns="45719" anchor="ctr"/>
+          <a:bodyPr lIns="45718" tIns="45718" rIns="45718" bIns="45718" anchor="ctr"/>
           <a:lstStyle/>
           <a:p>
-            <a:pPr/>
+            <a:pPr>
+              <a:defRPr>
+                <a:latin typeface="Arial"/>
+                <a:ea typeface="Arial"/>
+                <a:cs typeface="Arial"/>
+                <a:sym typeface="Arial"/>
+              </a:defRPr>
+            </a:pPr>
           </a:p>
         </p:txBody>
       </p:sp>
@@ -3229,7 +3303,7 @@
         <p:spPr>
           <a:xfrm>
             <a:off x="265500" y="1233175"/>
-            <a:ext cx="4045200" cy="1482301"/>
+            <a:ext cx="4045200" cy="1482302"/>
           </a:xfrm>
           <a:prstGeom prst="rect">
             <a:avLst/>
@@ -3359,7 +3433,7 @@
         <p:spPr>
           <a:xfrm>
             <a:off x="4939500" y="724074"/>
-            <a:ext cx="3837000" cy="3695102"/>
+            <a:ext cx="3837000" cy="3695103"/>
           </a:xfrm>
           <a:prstGeom prst="rect">
             <a:avLst/>
@@ -3431,8 +3505,8 @@
         </p:nvSpPr>
         <p:spPr>
           <a:xfrm>
-            <a:off x="311699" y="4230575"/>
-            <a:ext cx="5998802" cy="605101"/>
+            <a:off x="311698" y="4230575"/>
+            <a:ext cx="5998804" cy="605102"/>
           </a:xfrm>
           <a:prstGeom prst="rect">
             <a:avLst/>
@@ -3569,109 +3643,9 @@
           <a:chExt cx="0" cy="0"/>
         </a:xfrm>
       </p:grpSpPr>
-      <p:sp>
-        <p:nvSpPr>
-          <p:cNvPr id="2" name="Title Text"/>
-          <p:cNvSpPr txBox="1"/>
-          <p:nvPr>
-            <p:ph type="title"/>
-          </p:nvPr>
-        </p:nvSpPr>
-        <p:spPr>
-          <a:xfrm>
-            <a:off x="311699" y="445025"/>
-            <a:ext cx="8520602" cy="572701"/>
-          </a:xfrm>
-          <a:prstGeom prst="rect">
-            <a:avLst/>
-          </a:prstGeom>
-          <a:ln w="12700">
-            <a:miter lim="400000"/>
-          </a:ln>
-          <a:extLst>
-            <a:ext uri="{C572A759-6A51-4108-AA02-DFA0A04FC94B}">
-              <ma14:wrappingTextBoxFlag xmlns:ma14="http://schemas.microsoft.com/office/mac/drawingml/2011/main" val="1"/>
-            </a:ext>
-          </a:extLst>
-        </p:spPr>
-        <p:txBody>
-          <a:bodyPr lIns="91424" tIns="91424" rIns="91424" bIns="91424">
-            <a:normAutofit fontScale="100000" lnSpcReduction="0"/>
-          </a:bodyPr>
-          <a:lstStyle/>
-          <a:p>
-            <a:pPr/>
-            <a:r>
-              <a:t>Title Text</a:t>
-            </a:r>
-          </a:p>
-        </p:txBody>
-      </p:sp>
-      <p:sp>
-        <p:nvSpPr>
-          <p:cNvPr id="3" name="Body Level One…"/>
-          <p:cNvSpPr txBox="1"/>
-          <p:nvPr>
-            <p:ph type="body" idx="1"/>
-          </p:nvPr>
-        </p:nvSpPr>
-        <p:spPr>
-          <a:xfrm>
-            <a:off x="311699" y="1152475"/>
-            <a:ext cx="8520602" cy="3416400"/>
-          </a:xfrm>
-          <a:prstGeom prst="rect">
-            <a:avLst/>
-          </a:prstGeom>
-          <a:ln w="12700">
-            <a:miter lim="400000"/>
-          </a:ln>
-          <a:extLst>
-            <a:ext uri="{C572A759-6A51-4108-AA02-DFA0A04FC94B}">
-              <ma14:wrappingTextBoxFlag xmlns:ma14="http://schemas.microsoft.com/office/mac/drawingml/2011/main" val="1"/>
-            </a:ext>
-          </a:extLst>
-        </p:spPr>
-        <p:txBody>
-          <a:bodyPr lIns="91424" tIns="91424" rIns="91424" bIns="91424">
-            <a:normAutofit fontScale="100000" lnSpcReduction="0"/>
-          </a:bodyPr>
-          <a:lstStyle/>
-          <a:p>
-            <a:pPr/>
-            <a:r>
-              <a:t>Body Level One</a:t>
-            </a:r>
-          </a:p>
-          <a:p>
-            <a:pPr lvl="1"/>
-            <a:r>
-              <a:t>Body Level Two</a:t>
-            </a:r>
-          </a:p>
-          <a:p>
-            <a:pPr lvl="2"/>
-            <a:r>
-              <a:t>Body Level Three</a:t>
-            </a:r>
-          </a:p>
-          <a:p>
-            <a:pPr lvl="3"/>
-            <a:r>
-              <a:t>Body Level Four</a:t>
-            </a:r>
-          </a:p>
-          <a:p>
-            <a:pPr lvl="4"/>
-            <a:r>
-              <a:t>Body Level Five</a:t>
-            </a:r>
-          </a:p>
-        </p:txBody>
-      </p:sp>
       <p:pic>
         <p:nvPicPr>
-          <p:cNvPr id="4" name="Shape 20" descr="Shape 20"/>
+          <p:cNvPr id="2" name="Shape 20" descr="Shape 20"/>
           <p:cNvPicPr>
             <a:picLocks noChangeAspect="1"/>
           </p:cNvPicPr>
@@ -3688,7 +3662,7 @@
         <p:spPr>
           <a:xfrm>
             <a:off x="101925" y="4301123"/>
-            <a:ext cx="755722" cy="755701"/>
+            <a:ext cx="755722" cy="755702"/>
           </a:xfrm>
           <a:prstGeom prst="rect">
             <a:avLst/>
@@ -3698,6 +3672,106 @@
           </a:ln>
         </p:spPr>
       </p:pic>
+      <p:sp>
+        <p:nvSpPr>
+          <p:cNvPr id="3" name="Title Text"/>
+          <p:cNvSpPr txBox="1"/>
+          <p:nvPr>
+            <p:ph type="title"/>
+          </p:nvPr>
+        </p:nvSpPr>
+        <p:spPr>
+          <a:xfrm>
+            <a:off x="311698" y="445025"/>
+            <a:ext cx="8520603" cy="572702"/>
+          </a:xfrm>
+          <a:prstGeom prst="rect">
+            <a:avLst/>
+          </a:prstGeom>
+          <a:ln w="12700">
+            <a:miter lim="400000"/>
+          </a:ln>
+          <a:extLst>
+            <a:ext uri="{C572A759-6A51-4108-AA02-DFA0A04FC94B}">
+              <ma14:wrappingTextBoxFlag xmlns:ma14="http://schemas.microsoft.com/office/mac/drawingml/2011/main" val="1"/>
+            </a:ext>
+          </a:extLst>
+        </p:spPr>
+        <p:txBody>
+          <a:bodyPr lIns="91423" tIns="91423" rIns="91423" bIns="91423">
+            <a:normAutofit fontScale="100000" lnSpcReduction="0"/>
+          </a:bodyPr>
+          <a:lstStyle/>
+          <a:p>
+            <a:pPr/>
+            <a:r>
+              <a:t>Title Text</a:t>
+            </a:r>
+          </a:p>
+        </p:txBody>
+      </p:sp>
+      <p:sp>
+        <p:nvSpPr>
+          <p:cNvPr id="4" name="Body Level One…"/>
+          <p:cNvSpPr txBox="1"/>
+          <p:nvPr>
+            <p:ph type="body" idx="1"/>
+          </p:nvPr>
+        </p:nvSpPr>
+        <p:spPr>
+          <a:xfrm>
+            <a:off x="311698" y="1152475"/>
+            <a:ext cx="8520603" cy="3416400"/>
+          </a:xfrm>
+          <a:prstGeom prst="rect">
+            <a:avLst/>
+          </a:prstGeom>
+          <a:ln w="12700">
+            <a:miter lim="400000"/>
+          </a:ln>
+          <a:extLst>
+            <a:ext uri="{C572A759-6A51-4108-AA02-DFA0A04FC94B}">
+              <ma14:wrappingTextBoxFlag xmlns:ma14="http://schemas.microsoft.com/office/mac/drawingml/2011/main" val="1"/>
+            </a:ext>
+          </a:extLst>
+        </p:spPr>
+        <p:txBody>
+          <a:bodyPr lIns="91423" tIns="91423" rIns="91423" bIns="91423">
+            <a:normAutofit fontScale="100000" lnSpcReduction="0"/>
+          </a:bodyPr>
+          <a:lstStyle/>
+          <a:p>
+            <a:pPr/>
+            <a:r>
+              <a:t>Body Level One</a:t>
+            </a:r>
+          </a:p>
+          <a:p>
+            <a:pPr lvl="1"/>
+            <a:r>
+              <a:t>Body Level Two</a:t>
+            </a:r>
+          </a:p>
+          <a:p>
+            <a:pPr lvl="2"/>
+            <a:r>
+              <a:t>Body Level Three</a:t>
+            </a:r>
+          </a:p>
+          <a:p>
+            <a:pPr lvl="3"/>
+            <a:r>
+              <a:t>Body Level Four</a:t>
+            </a:r>
+          </a:p>
+          <a:p>
+            <a:pPr lvl="4"/>
+            <a:r>
+              <a:t>Body Level Five</a:t>
+            </a:r>
+          </a:p>
+        </p:txBody>
+      </p:sp>
       <p:sp>
         <p:nvSpPr>
           <p:cNvPr id="5" name="Slide Number"/>
@@ -3708,8 +3782,8 @@
         </p:nvSpPr>
         <p:spPr>
           <a:xfrm>
-            <a:off x="8684344" y="4700818"/>
-            <a:ext cx="336814" cy="318396"/>
+            <a:off x="8684347" y="4700819"/>
+            <a:ext cx="336812" cy="318394"/>
           </a:xfrm>
           <a:prstGeom prst="rect">
             <a:avLst/>
@@ -3719,17 +3793,19 @@
           </a:ln>
         </p:spPr>
         <p:txBody>
-          <a:bodyPr wrap="none" lIns="91424" tIns="91424" rIns="91424" bIns="91424" anchor="ctr">
+          <a:bodyPr wrap="none" lIns="91423" tIns="91423" rIns="91423" bIns="91423" anchor="ctr">
             <a:spAutoFit/>
           </a:bodyPr>
           <a:lstStyle>
             <a:lvl1pPr algn="r">
               <a:defRPr sz="1000">
                 <a:solidFill>
-                  <a:schemeClr val="accent2">
-                    <a:lumOff val="21764"/>
-                  </a:schemeClr>
+                  <a:srgbClr val="585858"/>
                 </a:solidFill>
+                <a:latin typeface="Arial"/>
+                <a:ea typeface="Arial"/>
+                <a:cs typeface="Arial"/>
+                <a:sym typeface="Arial"/>
               </a:defRPr>
             </a:lvl1pPr>
           </a:lstStyle>
@@ -4042,9 +4118,7 @@
             <a:noFill/>
           </a:ln>
           <a:solidFill>
-            <a:schemeClr val="accent2">
-              <a:lumOff val="21764"/>
-            </a:schemeClr>
+            <a:srgbClr val="585858"/>
           </a:solidFill>
           <a:uFillTx/>
           <a:latin typeface="Arial"/>
@@ -4073,9 +4147,7 @@
             <a:noFill/>
           </a:ln>
           <a:solidFill>
-            <a:schemeClr val="accent2">
-              <a:lumOff val="21764"/>
-            </a:schemeClr>
+            <a:srgbClr val="585858"/>
           </a:solidFill>
           <a:uFillTx/>
           <a:latin typeface="Arial"/>
@@ -4104,9 +4176,7 @@
             <a:noFill/>
           </a:ln>
           <a:solidFill>
-            <a:schemeClr val="accent2">
-              <a:lumOff val="21764"/>
-            </a:schemeClr>
+            <a:srgbClr val="585858"/>
           </a:solidFill>
           <a:uFillTx/>
           <a:latin typeface="Arial"/>
@@ -4135,9 +4205,7 @@
             <a:noFill/>
           </a:ln>
           <a:solidFill>
-            <a:schemeClr val="accent2">
-              <a:lumOff val="21764"/>
-            </a:schemeClr>
+            <a:srgbClr val="585858"/>
           </a:solidFill>
           <a:uFillTx/>
           <a:latin typeface="Arial"/>
@@ -4166,9 +4234,7 @@
             <a:noFill/>
           </a:ln>
           <a:solidFill>
-            <a:schemeClr val="accent2">
-              <a:lumOff val="21764"/>
-            </a:schemeClr>
+            <a:srgbClr val="585858"/>
           </a:solidFill>
           <a:uFillTx/>
           <a:latin typeface="Arial"/>
@@ -4197,9 +4263,7 @@
             <a:noFill/>
           </a:ln>
           <a:solidFill>
-            <a:schemeClr val="accent2">
-              <a:lumOff val="21764"/>
-            </a:schemeClr>
+            <a:srgbClr val="585858"/>
           </a:solidFill>
           <a:uFillTx/>
           <a:latin typeface="Arial"/>
@@ -4228,9 +4292,7 @@
             <a:noFill/>
           </a:ln>
           <a:solidFill>
-            <a:schemeClr val="accent2">
-              <a:lumOff val="21764"/>
-            </a:schemeClr>
+            <a:srgbClr val="585858"/>
           </a:solidFill>
           <a:uFillTx/>
           <a:latin typeface="Arial"/>
@@ -4259,9 +4321,7 @@
             <a:noFill/>
           </a:ln>
           <a:solidFill>
-            <a:schemeClr val="accent2">
-              <a:lumOff val="21764"/>
-            </a:schemeClr>
+            <a:srgbClr val="585858"/>
           </a:solidFill>
           <a:uFillTx/>
           <a:latin typeface="Arial"/>
@@ -4290,9 +4350,7 @@
             <a:noFill/>
           </a:ln>
           <a:solidFill>
-            <a:schemeClr val="accent2">
-              <a:lumOff val="21764"/>
-            </a:schemeClr>
+            <a:srgbClr val="585858"/>
           </a:solidFill>
           <a:uFillTx/>
           <a:latin typeface="Arial"/>
@@ -4604,7 +4662,7 @@
         <p:spPr>
           <a:xfrm>
             <a:off x="311707" y="744575"/>
-            <a:ext cx="8520602" cy="2052599"/>
+            <a:ext cx="8520602" cy="2052598"/>
           </a:xfrm>
           <a:prstGeom prst="rect">
             <a:avLst/>
@@ -4632,7 +4690,7 @@
         <p:spPr>
           <a:xfrm>
             <a:off x="311699" y="2834125"/>
-            <a:ext cx="8520602" cy="792601"/>
+            <a:ext cx="8520602" cy="792602"/>
           </a:xfrm>
           <a:prstGeom prst="rect">
             <a:avLst/>
@@ -4659,6 +4717,227 @@
 </file>
 
 <file path=ppt/slides/slide10.xml><?xml version="1.0" encoding="utf-8"?>
+<p:sld xmlns:a="http://schemas.openxmlformats.org/drawingml/2006/main" xmlns:r="http://schemas.openxmlformats.org/officeDocument/2006/relationships" xmlns:p="http://schemas.openxmlformats.org/presentationml/2006/main" showMasterSp="1" showMasterPhAnim="1">
+  <p:cSld>
+    <p:spTree>
+      <p:nvGrpSpPr>
+        <p:cNvPr id="1" name=""/>
+        <p:cNvGrpSpPr/>
+        <p:nvPr/>
+      </p:nvGrpSpPr>
+      <p:grpSpPr>
+        <a:xfrm>
+          <a:off x="0" y="0"/>
+          <a:ext cx="0" cy="0"/>
+          <a:chOff x="0" y="0"/>
+          <a:chExt cx="0" cy="0"/>
+        </a:xfrm>
+      </p:grpSpPr>
+      <p:sp>
+        <p:nvSpPr>
+          <p:cNvPr id="182" name="Shape 162"/>
+          <p:cNvSpPr/>
+          <p:nvPr/>
+        </p:nvSpPr>
+        <p:spPr>
+          <a:xfrm>
+            <a:off x="0" y="1193600"/>
+            <a:ext cx="9144000" cy="3518700"/>
+          </a:xfrm>
+          <a:prstGeom prst="rect">
+            <a:avLst/>
+          </a:prstGeom>
+          <a:solidFill>
+            <a:schemeClr val="accent5"/>
+          </a:solidFill>
+          <a:ln w="12700">
+            <a:miter lim="400000"/>
+          </a:ln>
+        </p:spPr>
+        <p:txBody>
+          <a:bodyPr lIns="45718" tIns="45718" rIns="45718" bIns="45718" anchor="ctr"/>
+          <a:lstStyle/>
+          <a:p>
+            <a:pPr>
+              <a:defRPr>
+                <a:latin typeface="Arial"/>
+                <a:ea typeface="Arial"/>
+                <a:cs typeface="Arial"/>
+                <a:sym typeface="Arial"/>
+              </a:defRPr>
+            </a:pPr>
+          </a:p>
+        </p:txBody>
+      </p:sp>
+      <p:sp>
+        <p:nvSpPr>
+          <p:cNvPr id="183" name="Shape 163"/>
+          <p:cNvSpPr txBox="1"/>
+          <p:nvPr>
+            <p:ph type="title" idx="4294967295"/>
+          </p:nvPr>
+        </p:nvSpPr>
+        <p:spPr>
+          <a:xfrm>
+            <a:off x="311699" y="445025"/>
+            <a:ext cx="8520602" cy="572702"/>
+          </a:xfrm>
+          <a:prstGeom prst="rect">
+            <a:avLst/>
+          </a:prstGeom>
+        </p:spPr>
+        <p:txBody>
+          <a:bodyPr/>
+          <a:lstStyle>
+            <a:lvl1pPr defTabSz="694944">
+              <a:defRPr sz="2100">
+                <a:latin typeface="Oswald"/>
+                <a:ea typeface="Oswald"/>
+                <a:cs typeface="Oswald"/>
+                <a:sym typeface="Oswald"/>
+              </a:defRPr>
+            </a:lvl1pPr>
+          </a:lstStyle>
+          <a:p>
+            <a:pPr/>
+            <a:r>
+              <a:t>Hackability &amp; Innovation by Inviting participation</a:t>
+            </a:r>
+          </a:p>
+        </p:txBody>
+      </p:sp>
+      <p:sp>
+        <p:nvSpPr>
+          <p:cNvPr id="184" name="Shape 164"/>
+          <p:cNvSpPr txBox="1"/>
+          <p:nvPr/>
+        </p:nvSpPr>
+        <p:spPr>
+          <a:xfrm>
+            <a:off x="311700" y="1422199"/>
+            <a:ext cx="8259000" cy="2760949"/>
+          </a:xfrm>
+          <a:prstGeom prst="rect">
+            <a:avLst/>
+          </a:prstGeom>
+          <a:ln w="12700">
+            <a:miter lim="400000"/>
+          </a:ln>
+          <a:extLst>
+            <a:ext uri="{C572A759-6A51-4108-AA02-DFA0A04FC94B}">
+              <ma14:wrappingTextBoxFlag xmlns:ma14="http://schemas.microsoft.com/office/mac/drawingml/2011/main" val="1"/>
+            </a:ext>
+          </a:extLst>
+        </p:spPr>
+        <p:txBody>
+          <a:bodyPr lIns="91423" tIns="91423" rIns="91423" bIns="91423">
+            <a:spAutoFit/>
+          </a:bodyPr>
+          <a:lstStyle/>
+          <a:p>
+            <a:pPr marL="457200" indent="-381000">
+              <a:buClr>
+                <a:srgbClr val="F3F3F3"/>
+              </a:buClr>
+              <a:buSzPct val="100000"/>
+              <a:buFont typeface="Roboto Regular"/>
+              <a:buChar char="➔"/>
+              <a:defRPr sz="2200">
+                <a:solidFill>
+                  <a:srgbClr val="F3F3F3"/>
+                </a:solidFill>
+                <a:latin typeface="Roboto Regular"/>
+                <a:ea typeface="Roboto Regular"/>
+                <a:cs typeface="Roboto Regular"/>
+                <a:sym typeface="Roboto Regular"/>
+              </a:defRPr>
+            </a:pPr>
+            <a:r>
+              <a:t>Community Calls. Here’s a guide, this is long term trust building. http://bit.ly/OS-calls</a:t>
+            </a:r>
+          </a:p>
+          <a:p>
+            <a:pPr>
+              <a:defRPr sz="2200">
+                <a:solidFill>
+                  <a:srgbClr val="F3F3F3"/>
+                </a:solidFill>
+                <a:latin typeface="Roboto Regular"/>
+                <a:ea typeface="Roboto Regular"/>
+                <a:cs typeface="Roboto Regular"/>
+                <a:sym typeface="Roboto Regular"/>
+              </a:defRPr>
+            </a:pPr>
+          </a:p>
+          <a:p>
+            <a:pPr marL="457200" indent="-381000">
+              <a:buClr>
+                <a:srgbClr val="F3F3F3"/>
+              </a:buClr>
+              <a:buSzPct val="100000"/>
+              <a:buFont typeface="Roboto Regular"/>
+              <a:buChar char="➔"/>
+              <a:defRPr sz="2200">
+                <a:solidFill>
+                  <a:srgbClr val="F3F3F3"/>
+                </a:solidFill>
+                <a:latin typeface="Roboto Regular"/>
+                <a:ea typeface="Roboto Regular"/>
+                <a:cs typeface="Roboto Regular"/>
+                <a:sym typeface="Roboto Regular"/>
+              </a:defRPr>
+            </a:pPr>
+            <a:r>
+              <a:t>Individual outreach. It’s so easy to say please and thank you, ask how people are.</a:t>
+            </a:r>
+          </a:p>
+          <a:p>
+            <a:pPr>
+              <a:defRPr sz="2200">
+                <a:solidFill>
+                  <a:srgbClr val="F3F3F3"/>
+                </a:solidFill>
+                <a:latin typeface="Roboto Regular"/>
+                <a:ea typeface="Roboto Regular"/>
+                <a:cs typeface="Roboto Regular"/>
+                <a:sym typeface="Roboto Regular"/>
+              </a:defRPr>
+            </a:pPr>
+          </a:p>
+          <a:p>
+            <a:pPr marL="457200" indent="-381000">
+              <a:buClr>
+                <a:srgbClr val="F3F3F3"/>
+              </a:buClr>
+              <a:buSzPct val="100000"/>
+              <a:buFont typeface="Roboto Regular"/>
+              <a:buChar char="➔"/>
+              <a:defRPr sz="2200">
+                <a:solidFill>
+                  <a:srgbClr val="F3F3F3"/>
+                </a:solidFill>
+                <a:latin typeface="Roboto Regular"/>
+                <a:ea typeface="Roboto Regular"/>
+                <a:cs typeface="Roboto Regular"/>
+                <a:sym typeface="Roboto Regular"/>
+              </a:defRPr>
+            </a:pPr>
+            <a:r>
+              <a:t>Listening. Amazing what you hear if you learn to listen well.</a:t>
+            </a:r>
+          </a:p>
+        </p:txBody>
+      </p:sp>
+    </p:spTree>
+  </p:cSld>
+  <p:clrMapOvr>
+    <a:masterClrMapping/>
+  </p:clrMapOvr>
+  <p:transition xmlns:p14="http://schemas.microsoft.com/office/powerpoint/2010/main" spd="med" advClick="1"/>
+</p:sld>
+</file>
+
+<file path=ppt/slides/slide11.xml><?xml version="1.0" encoding="utf-8"?>
 <p:sld xmlns:a="http://schemas.openxmlformats.org/drawingml/2006/main" xmlns:r="http://schemas.openxmlformats.org/officeDocument/2006/relationships" xmlns:p="http://schemas.openxmlformats.org/presentationml/2006/main" showMasterSp="1" showMasterPhAnim="1">
   <p:cSld>
     <p:bg>
@@ -4684,7 +4963,7 @@
       </p:grpSpPr>
       <p:sp>
         <p:nvSpPr>
-          <p:cNvPr id="183" name="Shape 211"/>
+          <p:cNvPr id="188" name="Shape 211"/>
           <p:cNvSpPr txBox="1"/>
           <p:nvPr>
             <p:ph type="subTitle" sz="quarter" idx="1"/>
@@ -4692,8 +4971,8 @@
         </p:nvSpPr>
         <p:spPr>
           <a:xfrm>
-            <a:off x="311699" y="2252574"/>
-            <a:ext cx="8520602" cy="792601"/>
+            <a:off x="311699" y="2252573"/>
+            <a:ext cx="8520602" cy="792602"/>
           </a:xfrm>
           <a:prstGeom prst="rect">
             <a:avLst/>
@@ -4710,98 +4989,6 @@
           </a:p>
         </p:txBody>
       </p:sp>
-    </p:spTree>
-  </p:cSld>
-  <p:clrMapOvr>
-    <a:masterClrMapping/>
-  </p:clrMapOvr>
-  <p:transition xmlns:p14="http://schemas.microsoft.com/office/powerpoint/2010/main" spd="med" advClick="1"/>
-</p:sld>
-</file>
-
-<file path=ppt/slides/slide11.xml><?xml version="1.0" encoding="utf-8"?>
-<p:sld xmlns:a="http://schemas.openxmlformats.org/drawingml/2006/main" xmlns:r="http://schemas.openxmlformats.org/officeDocument/2006/relationships" xmlns:p="http://schemas.openxmlformats.org/presentationml/2006/main" showMasterSp="1" showMasterPhAnim="1">
-  <p:cSld>
-    <p:spTree>
-      <p:nvGrpSpPr>
-        <p:cNvPr id="1" name=""/>
-        <p:cNvGrpSpPr/>
-        <p:nvPr/>
-      </p:nvGrpSpPr>
-      <p:grpSpPr>
-        <a:xfrm>
-          <a:off x="0" y="0"/>
-          <a:ext cx="0" cy="0"/>
-          <a:chOff x="0" y="0"/>
-          <a:chExt cx="0" cy="0"/>
-        </a:xfrm>
-      </p:grpSpPr>
-      <p:sp>
-        <p:nvSpPr>
-          <p:cNvPr id="187" name="Shape 151"/>
-          <p:cNvSpPr txBox="1"/>
-          <p:nvPr>
-            <p:ph type="title" idx="4294967295"/>
-          </p:nvPr>
-        </p:nvSpPr>
-        <p:spPr>
-          <a:xfrm>
-            <a:off x="311699" y="445025"/>
-            <a:ext cx="7283702" cy="572701"/>
-          </a:xfrm>
-          <a:prstGeom prst="rect">
-            <a:avLst/>
-          </a:prstGeom>
-        </p:spPr>
-        <p:txBody>
-          <a:bodyPr/>
-          <a:lstStyle>
-            <a:lvl1pPr defTabSz="694944">
-              <a:defRPr sz="2128">
-                <a:latin typeface="Oswald"/>
-                <a:ea typeface="Oswald"/>
-                <a:cs typeface="Oswald"/>
-                <a:sym typeface="Oswald"/>
-              </a:defRPr>
-            </a:lvl1pPr>
-          </a:lstStyle>
-          <a:p>
-            <a:pPr/>
-            <a:r>
-              <a:t>Transparency: Having a corner of the web</a:t>
-            </a:r>
-          </a:p>
-        </p:txBody>
-      </p:sp>
-      <p:pic>
-        <p:nvPicPr>
-          <p:cNvPr id="188" name="Shape 152" descr="Shape 152"/>
-          <p:cNvPicPr>
-            <a:picLocks noChangeAspect="1"/>
-          </p:cNvPicPr>
-          <p:nvPr/>
-        </p:nvPicPr>
-        <p:blipFill>
-          <a:blip r:embed="rId3">
-            <a:extLst/>
-          </a:blip>
-          <a:stretch>
-            <a:fillRect/>
-          </a:stretch>
-        </p:blipFill>
-        <p:spPr>
-          <a:xfrm>
-            <a:off x="1704975" y="1170124"/>
-            <a:ext cx="5734050" cy="3609976"/>
-          </a:xfrm>
-          <a:prstGeom prst="rect">
-            <a:avLst/>
-          </a:prstGeom>
-          <a:ln w="12700">
-            <a:miter lim="400000"/>
-          </a:ln>
-        </p:spPr>
-      </p:pic>
     </p:spTree>
   </p:cSld>
   <p:clrMapOvr>
@@ -4828,9 +5015,46 @@
           <a:chExt cx="0" cy="0"/>
         </a:xfrm>
       </p:grpSpPr>
+      <p:sp>
+        <p:nvSpPr>
+          <p:cNvPr id="192" name="Shape 151"/>
+          <p:cNvSpPr txBox="1"/>
+          <p:nvPr>
+            <p:ph type="title" idx="4294967295"/>
+          </p:nvPr>
+        </p:nvSpPr>
+        <p:spPr>
+          <a:xfrm>
+            <a:off x="311699" y="445025"/>
+            <a:ext cx="7283702" cy="572702"/>
+          </a:xfrm>
+          <a:prstGeom prst="rect">
+            <a:avLst/>
+          </a:prstGeom>
+        </p:spPr>
+        <p:txBody>
+          <a:bodyPr/>
+          <a:lstStyle>
+            <a:lvl1pPr defTabSz="694944">
+              <a:defRPr sz="2100">
+                <a:latin typeface="Oswald"/>
+                <a:ea typeface="Oswald"/>
+                <a:cs typeface="Oswald"/>
+                <a:sym typeface="Oswald"/>
+              </a:defRPr>
+            </a:lvl1pPr>
+          </a:lstStyle>
+          <a:p>
+            <a:pPr/>
+            <a:r>
+              <a:t>Transparency: Having a corner of the web</a:t>
+            </a:r>
+          </a:p>
+        </p:txBody>
+      </p:sp>
       <p:pic>
         <p:nvPicPr>
-          <p:cNvPr id="192" name="Shape 137" descr="Shape 137"/>
+          <p:cNvPr id="193" name="Shape 152" descr="Shape 152"/>
           <p:cNvPicPr>
             <a:picLocks noChangeAspect="1"/>
           </p:cNvPicPr>
@@ -4846,8 +5070,8 @@
         </p:blipFill>
         <p:spPr>
           <a:xfrm>
-            <a:off x="1600200" y="1422275"/>
-            <a:ext cx="5943600" cy="2857501"/>
+            <a:off x="1704975" y="1170124"/>
+            <a:ext cx="5734050" cy="3609977"/>
           </a:xfrm>
           <a:prstGeom prst="rect">
             <a:avLst/>
@@ -4857,42 +5081,6 @@
           </a:ln>
         </p:spPr>
       </p:pic>
-      <p:sp>
-        <p:nvSpPr>
-          <p:cNvPr id="193" name="Shape 138"/>
-          <p:cNvSpPr txBox="1"/>
-          <p:nvPr>
-            <p:ph type="ctrTitle"/>
-          </p:nvPr>
-        </p:nvSpPr>
-        <p:spPr>
-          <a:xfrm>
-            <a:off x="311699" y="445025"/>
-            <a:ext cx="7283702" cy="572701"/>
-          </a:xfrm>
-          <a:prstGeom prst="rect">
-            <a:avLst/>
-          </a:prstGeom>
-        </p:spPr>
-        <p:txBody>
-          <a:bodyPr anchor="t"/>
-          <a:lstStyle>
-            <a:lvl1pPr algn="l" defTabSz="694944">
-              <a:defRPr sz="2128">
-                <a:solidFill>
-                  <a:srgbClr val="000000"/>
-                </a:solidFill>
-              </a:defRPr>
-            </a:lvl1pPr>
-          </a:lstStyle>
-          <a:p>
-            <a:pPr/>
-            <a:r>
-              <a:t>Coordination: Agile Methodology</a:t>
-            </a:r>
-          </a:p>
-        </p:txBody>
-      </p:sp>
     </p:spTree>
   </p:cSld>
   <p:clrMapOvr>
@@ -4919,9 +5107,100 @@
           <a:chExt cx="0" cy="0"/>
         </a:xfrm>
       </p:grpSpPr>
+      <p:pic>
+        <p:nvPicPr>
+          <p:cNvPr id="197" name="Shape 137" descr="Shape 137"/>
+          <p:cNvPicPr>
+            <a:picLocks noChangeAspect="1"/>
+          </p:cNvPicPr>
+          <p:nvPr/>
+        </p:nvPicPr>
+        <p:blipFill>
+          <a:blip r:embed="rId3">
+            <a:extLst/>
+          </a:blip>
+          <a:stretch>
+            <a:fillRect/>
+          </a:stretch>
+        </p:blipFill>
+        <p:spPr>
+          <a:xfrm>
+            <a:off x="1600200" y="1422275"/>
+            <a:ext cx="5943600" cy="2857501"/>
+          </a:xfrm>
+          <a:prstGeom prst="rect">
+            <a:avLst/>
+          </a:prstGeom>
+          <a:ln w="12700">
+            <a:miter lim="400000"/>
+          </a:ln>
+        </p:spPr>
+      </p:pic>
       <p:sp>
         <p:nvSpPr>
-          <p:cNvPr id="197" name="Shape 108"/>
+          <p:cNvPr id="198" name="Shape 138"/>
+          <p:cNvSpPr txBox="1"/>
+          <p:nvPr>
+            <p:ph type="ctrTitle"/>
+          </p:nvPr>
+        </p:nvSpPr>
+        <p:spPr>
+          <a:xfrm>
+            <a:off x="311699" y="445025"/>
+            <a:ext cx="7283702" cy="572702"/>
+          </a:xfrm>
+          <a:prstGeom prst="rect">
+            <a:avLst/>
+          </a:prstGeom>
+        </p:spPr>
+        <p:txBody>
+          <a:bodyPr anchor="t"/>
+          <a:lstStyle>
+            <a:lvl1pPr algn="l" defTabSz="694944">
+              <a:defRPr sz="2100">
+                <a:solidFill>
+                  <a:srgbClr val="000000"/>
+                </a:solidFill>
+              </a:defRPr>
+            </a:lvl1pPr>
+          </a:lstStyle>
+          <a:p>
+            <a:pPr/>
+            <a:r>
+              <a:t>Coordination: Agile Methodology</a:t>
+            </a:r>
+          </a:p>
+        </p:txBody>
+      </p:sp>
+    </p:spTree>
+  </p:cSld>
+  <p:clrMapOvr>
+    <a:masterClrMapping/>
+  </p:clrMapOvr>
+  <p:transition xmlns:p14="http://schemas.microsoft.com/office/powerpoint/2010/main" spd="med" advClick="1"/>
+</p:sld>
+</file>
+
+<file path=ppt/slides/slide14.xml><?xml version="1.0" encoding="utf-8"?>
+<p:sld xmlns:a="http://schemas.openxmlformats.org/drawingml/2006/main" xmlns:r="http://schemas.openxmlformats.org/officeDocument/2006/relationships" xmlns:p="http://schemas.openxmlformats.org/presentationml/2006/main" showMasterSp="1" showMasterPhAnim="1">
+  <p:cSld>
+    <p:spTree>
+      <p:nvGrpSpPr>
+        <p:cNvPr id="1" name=""/>
+        <p:cNvGrpSpPr/>
+        <p:nvPr/>
+      </p:nvGrpSpPr>
+      <p:grpSpPr>
+        <a:xfrm>
+          <a:off x="0" y="0"/>
+          <a:ext cx="0" cy="0"/>
+          <a:chOff x="0" y="0"/>
+          <a:chExt cx="0" cy="0"/>
+        </a:xfrm>
+      </p:grpSpPr>
+      <p:sp>
+        <p:nvSpPr>
+          <p:cNvPr id="202" name="Shape 108"/>
           <p:cNvSpPr/>
           <p:nvPr/>
         </p:nvSpPr>
@@ -4941,16 +5220,23 @@
           </a:ln>
         </p:spPr>
         <p:txBody>
-          <a:bodyPr lIns="45719" rIns="45719" anchor="ctr"/>
+          <a:bodyPr lIns="45718" tIns="45718" rIns="45718" bIns="45718" anchor="ctr"/>
           <a:lstStyle/>
           <a:p>
-            <a:pPr/>
+            <a:pPr>
+              <a:defRPr>
+                <a:latin typeface="Arial"/>
+                <a:ea typeface="Arial"/>
+                <a:cs typeface="Arial"/>
+                <a:sym typeface="Arial"/>
+              </a:defRPr>
+            </a:pPr>
           </a:p>
         </p:txBody>
       </p:sp>
       <p:sp>
         <p:nvSpPr>
-          <p:cNvPr id="198" name="Shape 109"/>
+          <p:cNvPr id="203" name="Shape 109"/>
           <p:cNvSpPr txBox="1"/>
           <p:nvPr>
             <p:ph type="title" idx="4294967295"/>
@@ -4959,7 +5245,7 @@
         <p:spPr>
           <a:xfrm>
             <a:off x="311699" y="445025"/>
-            <a:ext cx="8520602" cy="572701"/>
+            <a:ext cx="8520602" cy="572702"/>
           </a:xfrm>
           <a:prstGeom prst="rect">
             <a:avLst/>
@@ -4969,7 +5255,7 @@
           <a:bodyPr/>
           <a:lstStyle>
             <a:lvl1pPr defTabSz="694944">
-              <a:defRPr sz="2128">
+              <a:defRPr sz="2100">
                 <a:latin typeface="Oswald"/>
                 <a:ea typeface="Oswald"/>
                 <a:cs typeface="Oswald"/>
@@ -4987,14 +5273,14 @@
       </p:sp>
       <p:sp>
         <p:nvSpPr>
-          <p:cNvPr id="199" name="Shape 110"/>
+          <p:cNvPr id="204" name="Shape 110"/>
           <p:cNvSpPr txBox="1"/>
           <p:nvPr/>
         </p:nvSpPr>
         <p:spPr>
           <a:xfrm>
             <a:off x="311700" y="1193599"/>
-            <a:ext cx="8259000" cy="3497551"/>
+            <a:ext cx="8259000" cy="3497548"/>
           </a:xfrm>
           <a:prstGeom prst="rect">
             <a:avLst/>
@@ -5009,7 +5295,7 @@
           </a:extLst>
         </p:spPr>
         <p:txBody>
-          <a:bodyPr lIns="91424" tIns="91424" rIns="91424" bIns="91424">
+          <a:bodyPr lIns="91423" tIns="91423" rIns="91423" bIns="91423">
             <a:spAutoFit/>
           </a:bodyPr>
           <a:lstStyle/>
@@ -5236,7 +5522,7 @@
         <p:spPr>
           <a:xfrm>
             <a:off x="3717299" y="246905"/>
-            <a:ext cx="1676401" cy="1666876"/>
+            <a:ext cx="1676402" cy="1666876"/>
           </a:xfrm>
           <a:prstGeom prst="rect">
             <a:avLst/>
@@ -5265,7 +5551,7 @@
         <p:spPr>
           <a:xfrm>
             <a:off x="3412499" y="2694830"/>
-            <a:ext cx="238126" cy="247651"/>
+            <a:ext cx="238127" cy="247652"/>
           </a:xfrm>
           <a:prstGeom prst="rect">
             <a:avLst/>
@@ -5294,7 +5580,7 @@
         <p:spPr>
           <a:xfrm>
             <a:off x="3417261" y="3023442"/>
-            <a:ext cx="228601" cy="228601"/>
+            <a:ext cx="228602" cy="228601"/>
           </a:xfrm>
           <a:prstGeom prst="rect">
             <a:avLst/>
@@ -5322,8 +5608,8 @@
         </p:blipFill>
         <p:spPr>
           <a:xfrm>
-            <a:off x="3412511" y="3333030"/>
-            <a:ext cx="238126" cy="238126"/>
+            <a:off x="3412511" y="3333029"/>
+            <a:ext cx="238127" cy="238127"/>
           </a:xfrm>
           <a:prstGeom prst="rect">
             <a:avLst/>
@@ -5341,7 +5627,7 @@
         </p:nvGraphicFramePr>
         <p:xfrm>
           <a:off x="2223067" y="1696292"/>
-          <a:ext cx="5147926" cy="2120901"/>
+          <a:ext cx="5147927" cy="2120901"/>
         </p:xfrm>
         <a:graphic xmlns:a="http://schemas.openxmlformats.org/drawingml/2006/main">
           <a:graphicData uri="http://schemas.openxmlformats.org/drawingml/2006/table">
@@ -5360,25 +5646,13 @@
                     <a:lstStyle/>
                     <a:p>
                       <a:pPr algn="l">
-                        <a:defRPr sz="1400"/>
+                        <a:defRPr b="1" sz="800">
+                          <a:latin typeface="Proxima Nova"/>
+                          <a:ea typeface="Proxima Nova"/>
+                          <a:cs typeface="Proxima Nova"/>
+                          <a:sym typeface="Proxima Nova"/>
+                        </a:defRPr>
                       </a:pPr>
-                      <a:endParaRPr b="1" sz="800">
-                        <a:latin typeface="Proxima Nova"/>
-                        <a:ea typeface="Proxima Nova"/>
-                        <a:cs typeface="Proxima Nova"/>
-                        <a:sym typeface="Proxima Nova"/>
-                      </a:endParaRPr>
-                    </a:p>
-                    <a:p>
-                      <a:pPr algn="l">
-                        <a:defRPr sz="1400"/>
-                      </a:pPr>
-                      <a:endParaRPr b="1" sz="800">
-                        <a:latin typeface="Proxima Nova"/>
-                        <a:ea typeface="Proxima Nova"/>
-                        <a:cs typeface="Proxima Nova"/>
-                        <a:sym typeface="Proxima Nova"/>
-                      </a:endParaRPr>
                     </a:p>
                   </a:txBody>
                   <a:tcPr marL="45725" marR="45725" marT="45725" marB="45725" anchor="t" anchorCtr="0" horzOverflow="overflow">
@@ -5410,14 +5684,13 @@
                     <a:lstStyle/>
                     <a:p>
                       <a:pPr algn="l">
-                        <a:defRPr sz="1400"/>
+                        <a:defRPr b="1" sz="1200">
+                          <a:latin typeface="Proxima Nova"/>
+                          <a:ea typeface="Proxima Nova"/>
+                          <a:cs typeface="Proxima Nova"/>
+                          <a:sym typeface="Proxima Nova"/>
+                        </a:defRPr>
                       </a:pPr>
-                      <a:endParaRPr b="1" sz="1200">
-                        <a:latin typeface="Proxima Nova"/>
-                        <a:ea typeface="Proxima Nova"/>
-                        <a:cs typeface="Proxima Nova"/>
-                        <a:sym typeface="Proxima Nova"/>
-                      </a:endParaRPr>
                     </a:p>
                     <a:p>
                       <a:pPr algn="l">
@@ -5450,14 +5723,13 @@
                     </a:p>
                     <a:p>
                       <a:pPr algn="l">
-                        <a:defRPr sz="1400"/>
+                        <a:defRPr b="1" sz="1200">
+                          <a:latin typeface="Proxima Nova"/>
+                          <a:ea typeface="Proxima Nova"/>
+                          <a:cs typeface="Proxima Nova"/>
+                          <a:sym typeface="Proxima Nova"/>
+                        </a:defRPr>
                       </a:pPr>
-                      <a:endParaRPr b="1" sz="1200">
-                        <a:latin typeface="Proxima Nova"/>
-                        <a:ea typeface="Proxima Nova"/>
-                        <a:cs typeface="Proxima Nova"/>
-                        <a:sym typeface="Proxima Nova"/>
-                      </a:endParaRPr>
                     </a:p>
                     <a:p>
                       <a:pPr algn="l">
@@ -5512,14 +5784,13 @@
                         <a:lnSpc>
                           <a:spcPct val="115000"/>
                         </a:lnSpc>
-                        <a:defRPr sz="1400"/>
+                        <a:defRPr b="1">
+                          <a:latin typeface="Proxima Nova"/>
+                          <a:ea typeface="Proxima Nova"/>
+                          <a:cs typeface="Proxima Nova"/>
+                          <a:sym typeface="Proxima Nova"/>
+                        </a:defRPr>
                       </a:pPr>
-                      <a:endParaRPr b="1" sz="1000">
-                        <a:latin typeface="Proxima Nova"/>
-                        <a:ea typeface="Proxima Nova"/>
-                        <a:cs typeface="Proxima Nova"/>
-                        <a:sym typeface="Proxima Nova"/>
-                      </a:endParaRPr>
                     </a:p>
                     <a:p>
                       <a:pPr algn="l">
@@ -5589,7 +5860,7 @@
         <p:spPr>
           <a:xfrm>
             <a:off x="7189885" y="3945832"/>
-            <a:ext cx="1090299" cy="1044521"/>
+            <a:ext cx="1090300" cy="1044522"/>
           </a:xfrm>
           <a:prstGeom prst="rect">
             <a:avLst/>
@@ -5617,8 +5888,8 @@
         </p:blipFill>
         <p:spPr>
           <a:xfrm>
-            <a:off x="3609909" y="4312623"/>
-            <a:ext cx="2374243" cy="553454"/>
+            <a:off x="3609909" y="4312622"/>
+            <a:ext cx="2374244" cy="553455"/>
           </a:xfrm>
           <a:prstGeom prst="rect">
             <a:avLst/>
@@ -5646,8 +5917,8 @@
         </p:blipFill>
         <p:spPr>
           <a:xfrm>
-            <a:off x="288597" y="959898"/>
-            <a:ext cx="2688804" cy="2715704"/>
+            <a:off x="288596" y="959897"/>
+            <a:ext cx="2688806" cy="2715706"/>
           </a:xfrm>
           <a:prstGeom prst="rect">
             <a:avLst/>
@@ -5676,7 +5947,7 @@
         <p:spPr>
           <a:xfrm>
             <a:off x="6326072" y="1012725"/>
-            <a:ext cx="2817926" cy="2610050"/>
+            <a:ext cx="2817927" cy="2610050"/>
           </a:xfrm>
           <a:prstGeom prst="rect">
             <a:avLst/>
@@ -5704,8 +5975,8 @@
         </p:blipFill>
         <p:spPr>
           <a:xfrm>
-            <a:off x="175296" y="4191794"/>
-            <a:ext cx="2915407" cy="795112"/>
+            <a:off x="175295" y="4191794"/>
+            <a:ext cx="2915408" cy="795113"/>
           </a:xfrm>
           <a:prstGeom prst="rect">
             <a:avLst/>
@@ -5725,6 +5996,257 @@
 </file>
 
 <file path=ppt/slides/slide3.xml><?xml version="1.0" encoding="utf-8"?>
+<p:sld xmlns:a="http://schemas.openxmlformats.org/drawingml/2006/main" xmlns:r="http://schemas.openxmlformats.org/officeDocument/2006/relationships" xmlns:p="http://schemas.openxmlformats.org/presentationml/2006/main" showMasterSp="1" showMasterPhAnim="1">
+  <p:cSld>
+    <p:spTree>
+      <p:nvGrpSpPr>
+        <p:cNvPr id="1" name=""/>
+        <p:cNvGrpSpPr/>
+        <p:nvPr/>
+      </p:nvGrpSpPr>
+      <p:grpSpPr>
+        <a:xfrm>
+          <a:off x="0" y="0"/>
+          <a:ext cx="0" cy="0"/>
+          <a:chOff x="0" y="0"/>
+          <a:chExt cx="0" cy="0"/>
+        </a:xfrm>
+      </p:grpSpPr>
+      <p:pic>
+        <p:nvPicPr>
+          <p:cNvPr id="134" name="PTr0gch2s8tYOm0NlfETdGwJVJAfmzQSqyqFDXVHxzUFKK_hjvGQ6C4odrminRk3LBqrn1y61srKHF5rE4rfJG5eJ_eCxyvYPwBJ3i0HQwkie_B1d2okuJcRqNE3YUiRqt1u0ELSnOw.png" descr="PTr0gch2s8tYOm0NlfETdGwJVJAfmzQSqyqFDXVHxzUFKK_hjvGQ6C4odrminRk3LBqrn1y61srKHF5rE4rfJG5eJ_eCxyvYPwBJ3i0HQwkie_B1d2okuJcRqNE3YUiRqt1u0ELSnOw.png"/>
+          <p:cNvPicPr>
+            <a:picLocks noChangeAspect="1"/>
+          </p:cNvPicPr>
+          <p:nvPr/>
+        </p:nvPicPr>
+        <p:blipFill>
+          <a:blip r:embed="rId3">
+            <a:extLst/>
+          </a:blip>
+          <a:stretch>
+            <a:fillRect/>
+          </a:stretch>
+        </p:blipFill>
+        <p:spPr>
+          <a:xfrm>
+            <a:off x="5260998" y="-71"/>
+            <a:ext cx="3901014" cy="5343405"/>
+          </a:xfrm>
+          <a:prstGeom prst="rect">
+            <a:avLst/>
+          </a:prstGeom>
+          <a:ln w="12700">
+            <a:miter lim="400000"/>
+          </a:ln>
+        </p:spPr>
+      </p:pic>
+      <p:sp>
+        <p:nvSpPr>
+          <p:cNvPr id="135" name="What does “open”…"/>
+          <p:cNvSpPr txBox="1"/>
+          <p:nvPr/>
+        </p:nvSpPr>
+        <p:spPr>
+          <a:xfrm>
+            <a:off x="253260" y="177800"/>
+            <a:ext cx="3861321" cy="4066538"/>
+          </a:xfrm>
+          <a:prstGeom prst="rect">
+            <a:avLst/>
+          </a:prstGeom>
+          <a:ln w="12700">
+            <a:miter lim="400000"/>
+          </a:ln>
+          <a:extLst>
+            <a:ext uri="{C572A759-6A51-4108-AA02-DFA0A04FC94B}">
+              <ma14:wrappingTextBoxFlag xmlns:ma14="http://schemas.microsoft.com/office/mac/drawingml/2011/main" val="1"/>
+            </a:ext>
+          </a:extLst>
+        </p:spPr>
+        <p:txBody>
+          <a:bodyPr wrap="none" lIns="45718" tIns="45718" rIns="45718" bIns="45718">
+            <a:spAutoFit/>
+          </a:bodyPr>
+          <a:lstStyle/>
+          <a:p>
+            <a:pPr defTabSz="457200">
+              <a:lnSpc>
+                <a:spcPts val="8800"/>
+              </a:lnSpc>
+              <a:defRPr sz="3733">
+                <a:latin typeface="Oswald"/>
+                <a:ea typeface="Oswald"/>
+                <a:cs typeface="Oswald"/>
+                <a:sym typeface="Oswald"/>
+              </a:defRPr>
+            </a:pPr>
+            <a:r>
+              <a:t>What does “open” </a:t>
+            </a:r>
+          </a:p>
+          <a:p>
+            <a:pPr defTabSz="457200">
+              <a:lnSpc>
+                <a:spcPts val="8800"/>
+              </a:lnSpc>
+              <a:defRPr sz="3733">
+                <a:latin typeface="Oswald"/>
+                <a:ea typeface="Oswald"/>
+                <a:cs typeface="Oswald"/>
+                <a:sym typeface="Oswald"/>
+              </a:defRPr>
+            </a:pPr>
+            <a:r>
+              <a:t>really mean? </a:t>
+            </a:r>
+          </a:p>
+          <a:p>
+            <a:pPr defTabSz="457200">
+              <a:lnSpc>
+                <a:spcPts val="8800"/>
+              </a:lnSpc>
+              <a:defRPr sz="3733">
+                <a:latin typeface="Oswald"/>
+                <a:ea typeface="Oswald"/>
+                <a:cs typeface="Oswald"/>
+                <a:sym typeface="Oswald"/>
+              </a:defRPr>
+            </a:pPr>
+            <a:endParaRPr sz="1200">
+              <a:latin typeface="Times"/>
+              <a:ea typeface="Times"/>
+              <a:cs typeface="Times"/>
+              <a:sym typeface="Times"/>
+            </a:endParaRPr>
+          </a:p>
+          <a:p>
+            <a:pPr defTabSz="457200">
+              <a:lnSpc>
+                <a:spcPts val="2800"/>
+              </a:lnSpc>
+              <a:defRPr sz="1200">
+                <a:latin typeface="Times"/>
+                <a:ea typeface="Times"/>
+                <a:cs typeface="Times"/>
+                <a:sym typeface="Times"/>
+              </a:defRPr>
+            </a:pPr>
+          </a:p>
+          <a:p>
+            <a:pPr marL="240631" indent="-240631" defTabSz="457200">
+              <a:lnSpc>
+                <a:spcPts val="5600"/>
+              </a:lnSpc>
+              <a:buSzPct val="100000"/>
+              <a:buChar char="•"/>
+              <a:defRPr sz="2400">
+                <a:latin typeface="Oswald"/>
+                <a:ea typeface="Oswald"/>
+                <a:cs typeface="Oswald"/>
+                <a:sym typeface="Oswald"/>
+              </a:defRPr>
+            </a:pPr>
+            <a:r>
+              <a:t>Transparency</a:t>
+            </a:r>
+            <a:endParaRPr sz="1200">
+              <a:latin typeface="Times"/>
+              <a:ea typeface="Times"/>
+              <a:cs typeface="Times"/>
+              <a:sym typeface="Times"/>
+            </a:endParaRPr>
+          </a:p>
+          <a:p>
+            <a:pPr marL="120315" indent="-120315" defTabSz="457200">
+              <a:lnSpc>
+                <a:spcPts val="2800"/>
+              </a:lnSpc>
+              <a:buSzPct val="100000"/>
+              <a:buChar char="•"/>
+              <a:defRPr sz="1200">
+                <a:latin typeface="Times"/>
+                <a:ea typeface="Times"/>
+                <a:cs typeface="Times"/>
+                <a:sym typeface="Times"/>
+              </a:defRPr>
+            </a:pPr>
+          </a:p>
+          <a:p>
+            <a:pPr marL="240631" indent="-240631" defTabSz="457200">
+              <a:lnSpc>
+                <a:spcPts val="5600"/>
+              </a:lnSpc>
+              <a:buSzPct val="100000"/>
+              <a:buChar char="•"/>
+              <a:defRPr sz="2400">
+                <a:latin typeface="Oswald"/>
+                <a:ea typeface="Oswald"/>
+                <a:cs typeface="Oswald"/>
+                <a:sym typeface="Oswald"/>
+              </a:defRPr>
+            </a:pPr>
+            <a:r>
+              <a:t>Decentralization</a:t>
+            </a:r>
+            <a:endParaRPr sz="1200">
+              <a:latin typeface="Times"/>
+              <a:ea typeface="Times"/>
+              <a:cs typeface="Times"/>
+              <a:sym typeface="Times"/>
+            </a:endParaRPr>
+          </a:p>
+          <a:p>
+            <a:pPr marL="120315" indent="-120315" defTabSz="457200">
+              <a:lnSpc>
+                <a:spcPts val="2800"/>
+              </a:lnSpc>
+              <a:buSzPct val="100000"/>
+              <a:buChar char="•"/>
+              <a:defRPr sz="1200">
+                <a:latin typeface="Times"/>
+                <a:ea typeface="Times"/>
+                <a:cs typeface="Times"/>
+                <a:sym typeface="Times"/>
+              </a:defRPr>
+            </a:pPr>
+          </a:p>
+          <a:p>
+            <a:pPr marL="240631" indent="-240631" defTabSz="457200">
+              <a:lnSpc>
+                <a:spcPts val="5600"/>
+              </a:lnSpc>
+              <a:buSzPct val="100000"/>
+              <a:buChar char="•"/>
+              <a:defRPr sz="2400">
+                <a:latin typeface="Oswald"/>
+                <a:ea typeface="Oswald"/>
+                <a:cs typeface="Oswald"/>
+                <a:sym typeface="Oswald"/>
+              </a:defRPr>
+            </a:pPr>
+            <a:r>
+              <a:t>Hackability / Innovation</a:t>
+            </a:r>
+            <a:endParaRPr sz="1200">
+              <a:latin typeface="Times"/>
+              <a:ea typeface="Times"/>
+              <a:cs typeface="Times"/>
+              <a:sym typeface="Times"/>
+            </a:endParaRPr>
+          </a:p>
+        </p:txBody>
+      </p:sp>
+    </p:spTree>
+  </p:cSld>
+  <p:clrMapOvr>
+    <a:masterClrMapping/>
+  </p:clrMapOvr>
+  <p:transition xmlns:p14="http://schemas.microsoft.com/office/powerpoint/2010/main" spd="med" advClick="1"/>
+</p:sld>
+</file>
+
+<file path=ppt/slides/slide4.xml><?xml version="1.0" encoding="utf-8"?>
 <p:sld xmlns:a="http://schemas.openxmlformats.org/drawingml/2006/main" xmlns:r="http://schemas.openxmlformats.org/officeDocument/2006/relationships" xmlns:p="http://schemas.openxmlformats.org/presentationml/2006/main" showMasterSp="1" showMasterPhAnim="1">
   <p:cSld>
     <p:bg>
@@ -5750,7 +6272,7 @@
       </p:grpSpPr>
       <p:sp>
         <p:nvSpPr>
-          <p:cNvPr id="134" name="Shape 94"/>
+          <p:cNvPr id="139" name="Shape 94"/>
           <p:cNvSpPr txBox="1"/>
           <p:nvPr>
             <p:ph type="subTitle" sz="quarter" idx="1"/>
@@ -5758,8 +6280,8 @@
         </p:nvSpPr>
         <p:spPr>
           <a:xfrm>
-            <a:off x="311699" y="2252574"/>
-            <a:ext cx="8520602" cy="792601"/>
+            <a:off x="311699" y="2252573"/>
+            <a:ext cx="8520602" cy="792602"/>
           </a:xfrm>
           <a:prstGeom prst="rect">
             <a:avLst/>
@@ -5785,7 +6307,7 @@
 </p:sld>
 </file>
 
-<file path=ppt/slides/slide4.xml><?xml version="1.0" encoding="utf-8"?>
+<file path=ppt/slides/slide5.xml><?xml version="1.0" encoding="utf-8"?>
 <p:sld xmlns:a="http://schemas.openxmlformats.org/drawingml/2006/main" xmlns:r="http://schemas.openxmlformats.org/officeDocument/2006/relationships" xmlns:p="http://schemas.openxmlformats.org/presentationml/2006/main" showMasterSp="1" showMasterPhAnim="1">
   <p:cSld>
     <p:spTree>
@@ -5804,14 +6326,14 @@
       </p:grpSpPr>
       <p:sp>
         <p:nvSpPr>
-          <p:cNvPr id="138" name="Shape 99"/>
+          <p:cNvPr id="143" name="Shape 99"/>
           <p:cNvSpPr/>
           <p:nvPr/>
         </p:nvSpPr>
         <p:spPr>
           <a:xfrm>
-            <a:off x="647125" y="1526224"/>
-            <a:ext cx="3918601" cy="2518764"/>
+            <a:off x="647124" y="1526223"/>
+            <a:ext cx="3918603" cy="2518766"/>
           </a:xfrm>
           <a:custGeom>
             <a:avLst/>
@@ -5867,23 +6389,28 @@
           </a:solidFill>
           <a:ln>
             <a:solidFill>
-              <a:schemeClr val="accent2">
-                <a:lumOff val="21764"/>
-              </a:schemeClr>
+              <a:srgbClr val="585858"/>
             </a:solidFill>
           </a:ln>
         </p:spPr>
         <p:txBody>
-          <a:bodyPr lIns="45719" rIns="45719" anchor="ctr"/>
+          <a:bodyPr lIns="45718" tIns="45718" rIns="45718" bIns="45718" anchor="ctr"/>
           <a:lstStyle/>
           <a:p>
-            <a:pPr/>
+            <a:pPr>
+              <a:defRPr>
+                <a:latin typeface="Arial"/>
+                <a:ea typeface="Arial"/>
+                <a:cs typeface="Arial"/>
+                <a:sym typeface="Arial"/>
+              </a:defRPr>
+            </a:pPr>
           </a:p>
         </p:txBody>
       </p:sp>
       <p:sp>
         <p:nvSpPr>
-          <p:cNvPr id="139" name="Shape 100"/>
+          <p:cNvPr id="144" name="Shape 100"/>
           <p:cNvSpPr txBox="1"/>
           <p:nvPr>
             <p:ph type="title" idx="4294967295"/>
@@ -5892,7 +6419,7 @@
         <p:spPr>
           <a:xfrm>
             <a:off x="311699" y="445025"/>
-            <a:ext cx="8520602" cy="572701"/>
+            <a:ext cx="8520602" cy="572702"/>
           </a:xfrm>
           <a:prstGeom prst="rect">
             <a:avLst/>
@@ -5902,7 +6429,7 @@
           <a:bodyPr/>
           <a:lstStyle>
             <a:lvl1pPr defTabSz="694944">
-              <a:defRPr sz="2128">
+              <a:defRPr sz="2100">
                 <a:latin typeface="Oswald"/>
                 <a:ea typeface="Oswald"/>
                 <a:cs typeface="Oswald"/>
@@ -5920,14 +6447,14 @@
       </p:sp>
       <p:sp>
         <p:nvSpPr>
-          <p:cNvPr id="140" name="Shape 101"/>
+          <p:cNvPr id="145" name="Shape 101"/>
           <p:cNvSpPr txBox="1"/>
           <p:nvPr/>
         </p:nvSpPr>
         <p:spPr>
           <a:xfrm>
             <a:off x="768150" y="1748475"/>
-            <a:ext cx="3600900" cy="1592551"/>
+            <a:ext cx="3600900" cy="1592549"/>
           </a:xfrm>
           <a:prstGeom prst="rect">
             <a:avLst/>
@@ -5942,7 +6469,7 @@
           </a:extLst>
         </p:spPr>
         <p:txBody>
-          <a:bodyPr lIns="91424" tIns="91424" rIns="91424" bIns="91424">
+          <a:bodyPr lIns="91423" tIns="91423" rIns="91423" bIns="91423">
             <a:spAutoFit/>
           </a:bodyPr>
           <a:lstStyle>
@@ -5968,14 +6495,14 @@
       </p:sp>
       <p:sp>
         <p:nvSpPr>
-          <p:cNvPr id="141" name="Shape 102"/>
+          <p:cNvPr id="146" name="Shape 102"/>
           <p:cNvSpPr txBox="1"/>
           <p:nvPr/>
         </p:nvSpPr>
         <p:spPr>
           <a:xfrm>
-            <a:off x="991525" y="4117649"/>
-            <a:ext cx="5809201" cy="424151"/>
+            <a:off x="991524" y="4117649"/>
+            <a:ext cx="5809203" cy="424149"/>
           </a:xfrm>
           <a:prstGeom prst="rect">
             <a:avLst/>
@@ -5990,7 +6517,7 @@
           </a:extLst>
         </p:spPr>
         <p:txBody>
-          <a:bodyPr lIns="91424" tIns="91424" rIns="91424" bIns="91424">
+          <a:bodyPr lIns="91423" tIns="91423" rIns="91423" bIns="91423">
             <a:spAutoFit/>
           </a:bodyPr>
           <a:lstStyle>
@@ -6013,7 +6540,7 @@
       </p:sp>
       <p:pic>
         <p:nvPicPr>
-          <p:cNvPr id="142" name="Shape 103" descr="Shape 103"/>
+          <p:cNvPr id="147" name="Shape 103" descr="Shape 103"/>
           <p:cNvPicPr>
             <a:picLocks noChangeAspect="1"/>
           </p:cNvPicPr>
@@ -6030,7 +6557,7 @@
         <p:spPr>
           <a:xfrm>
             <a:off x="5018249" y="1248111"/>
-            <a:ext cx="3722356" cy="2795126"/>
+            <a:ext cx="3722357" cy="2795127"/>
           </a:xfrm>
           <a:prstGeom prst="rect">
             <a:avLst/>
@@ -6040,98 +6567,6 @@
           </a:ln>
         </p:spPr>
       </p:pic>
-    </p:spTree>
-  </p:cSld>
-  <p:clrMapOvr>
-    <a:masterClrMapping/>
-  </p:clrMapOvr>
-  <p:transition xmlns:p14="http://schemas.microsoft.com/office/powerpoint/2010/main" spd="med" advClick="1"/>
-</p:sld>
-</file>
-
-<file path=ppt/slides/slide5.xml><?xml version="1.0" encoding="utf-8"?>
-<p:sld xmlns:a="http://schemas.openxmlformats.org/drawingml/2006/main" xmlns:r="http://schemas.openxmlformats.org/officeDocument/2006/relationships" xmlns:p="http://schemas.openxmlformats.org/presentationml/2006/main" showMasterSp="1" showMasterPhAnim="1">
-  <p:cSld>
-    <p:spTree>
-      <p:nvGrpSpPr>
-        <p:cNvPr id="1" name=""/>
-        <p:cNvGrpSpPr/>
-        <p:nvPr/>
-      </p:nvGrpSpPr>
-      <p:grpSpPr>
-        <a:xfrm>
-          <a:off x="0" y="0"/>
-          <a:ext cx="0" cy="0"/>
-          <a:chOff x="0" y="0"/>
-          <a:chExt cx="0" cy="0"/>
-        </a:xfrm>
-      </p:grpSpPr>
-      <p:pic>
-        <p:nvPicPr>
-          <p:cNvPr id="146" name="Shape 115" descr="Shape 115"/>
-          <p:cNvPicPr>
-            <a:picLocks noChangeAspect="1"/>
-          </p:cNvPicPr>
-          <p:nvPr/>
-        </p:nvPicPr>
-        <p:blipFill>
-          <a:blip r:embed="rId3">
-            <a:extLst/>
-          </a:blip>
-          <a:stretch>
-            <a:fillRect/>
-          </a:stretch>
-        </p:blipFill>
-        <p:spPr>
-          <a:xfrm>
-            <a:off x="2264149" y="1466300"/>
-            <a:ext cx="4615702" cy="3469998"/>
-          </a:xfrm>
-          <a:prstGeom prst="rect">
-            <a:avLst/>
-          </a:prstGeom>
-          <a:ln w="12700">
-            <a:miter lim="400000"/>
-          </a:ln>
-        </p:spPr>
-      </p:pic>
-      <p:sp>
-        <p:nvSpPr>
-          <p:cNvPr id="147" name="Shape 116"/>
-          <p:cNvSpPr txBox="1"/>
-          <p:nvPr>
-            <p:ph type="title" idx="4294967295"/>
-          </p:nvPr>
-        </p:nvSpPr>
-        <p:spPr>
-          <a:xfrm>
-            <a:off x="311699" y="445025"/>
-            <a:ext cx="7283702" cy="572701"/>
-          </a:xfrm>
-          <a:prstGeom prst="rect">
-            <a:avLst/>
-          </a:prstGeom>
-        </p:spPr>
-        <p:txBody>
-          <a:bodyPr/>
-          <a:lstStyle>
-            <a:lvl1pPr defTabSz="694944">
-              <a:defRPr sz="2128">
-                <a:latin typeface="Oswald"/>
-                <a:ea typeface="Oswald"/>
-                <a:cs typeface="Oswald"/>
-                <a:sym typeface="Oswald"/>
-              </a:defRPr>
-            </a:lvl1pPr>
-          </a:lstStyle>
-          <a:p>
-            <a:pPr/>
-            <a:r>
-              <a:t>How distributed leadership looks like</a:t>
-            </a:r>
-          </a:p>
-        </p:txBody>
-      </p:sp>
     </p:spTree>
   </p:cSld>
   <p:clrMapOvr>
@@ -6160,7 +6595,7 @@
       </p:grpSpPr>
       <p:pic>
         <p:nvPicPr>
-          <p:cNvPr id="151" name="Shape 121" descr="Shape 121"/>
+          <p:cNvPr id="151" name="Shape 115" descr="Shape 115"/>
           <p:cNvPicPr>
             <a:picLocks noChangeAspect="1"/>
           </p:cNvPicPr>
@@ -6176,8 +6611,8 @@
         </p:blipFill>
         <p:spPr>
           <a:xfrm>
-            <a:off x="757237" y="646700"/>
-            <a:ext cx="7629526" cy="4371976"/>
+            <a:off x="2264149" y="1466300"/>
+            <a:ext cx="4615702" cy="3469998"/>
           </a:xfrm>
           <a:prstGeom prst="rect">
             <a:avLst/>
@@ -6189,7 +6624,7 @@
       </p:pic>
       <p:sp>
         <p:nvSpPr>
-          <p:cNvPr id="152" name="Shape 122"/>
+          <p:cNvPr id="152" name="Shape 116"/>
           <p:cNvSpPr txBox="1"/>
           <p:nvPr>
             <p:ph type="title" idx="4294967295"/>
@@ -6198,7 +6633,7 @@
         <p:spPr>
           <a:xfrm>
             <a:off x="311699" y="445025"/>
-            <a:ext cx="7283702" cy="572701"/>
+            <a:ext cx="7283702" cy="572702"/>
           </a:xfrm>
           <a:prstGeom prst="rect">
             <a:avLst/>
@@ -6208,7 +6643,7 @@
           <a:bodyPr/>
           <a:lstStyle>
             <a:lvl1pPr defTabSz="694944">
-              <a:defRPr sz="2128">
+              <a:defRPr sz="2100">
                 <a:latin typeface="Oswald"/>
                 <a:ea typeface="Oswald"/>
                 <a:cs typeface="Oswald"/>
@@ -6219,7 +6654,7 @@
           <a:p>
             <a:pPr/>
             <a:r>
-              <a:t>Decentralized Planet 4 Team</a:t>
+              <a:t>How distributed leadership looks like</a:t>
             </a:r>
           </a:p>
         </p:txBody>
@@ -6234,6 +6669,98 @@
 </file>
 
 <file path=ppt/slides/slide7.xml><?xml version="1.0" encoding="utf-8"?>
+<p:sld xmlns:a="http://schemas.openxmlformats.org/drawingml/2006/main" xmlns:r="http://schemas.openxmlformats.org/officeDocument/2006/relationships" xmlns:p="http://schemas.openxmlformats.org/presentationml/2006/main" showMasterSp="1" showMasterPhAnim="1">
+  <p:cSld>
+    <p:spTree>
+      <p:nvGrpSpPr>
+        <p:cNvPr id="1" name=""/>
+        <p:cNvGrpSpPr/>
+        <p:nvPr/>
+      </p:nvGrpSpPr>
+      <p:grpSpPr>
+        <a:xfrm>
+          <a:off x="0" y="0"/>
+          <a:ext cx="0" cy="0"/>
+          <a:chOff x="0" y="0"/>
+          <a:chExt cx="0" cy="0"/>
+        </a:xfrm>
+      </p:grpSpPr>
+      <p:pic>
+        <p:nvPicPr>
+          <p:cNvPr id="156" name="Shape 121" descr="Shape 121"/>
+          <p:cNvPicPr>
+            <a:picLocks noChangeAspect="1"/>
+          </p:cNvPicPr>
+          <p:nvPr/>
+        </p:nvPicPr>
+        <p:blipFill>
+          <a:blip r:embed="rId3">
+            <a:extLst/>
+          </a:blip>
+          <a:stretch>
+            <a:fillRect/>
+          </a:stretch>
+        </p:blipFill>
+        <p:spPr>
+          <a:xfrm>
+            <a:off x="757237" y="646700"/>
+            <a:ext cx="7629526" cy="4371977"/>
+          </a:xfrm>
+          <a:prstGeom prst="rect">
+            <a:avLst/>
+          </a:prstGeom>
+          <a:ln w="12700">
+            <a:miter lim="400000"/>
+          </a:ln>
+        </p:spPr>
+      </p:pic>
+      <p:sp>
+        <p:nvSpPr>
+          <p:cNvPr id="157" name="Shape 122"/>
+          <p:cNvSpPr txBox="1"/>
+          <p:nvPr>
+            <p:ph type="title" idx="4294967295"/>
+          </p:nvPr>
+        </p:nvSpPr>
+        <p:spPr>
+          <a:xfrm>
+            <a:off x="311699" y="445025"/>
+            <a:ext cx="7283702" cy="572702"/>
+          </a:xfrm>
+          <a:prstGeom prst="rect">
+            <a:avLst/>
+          </a:prstGeom>
+        </p:spPr>
+        <p:txBody>
+          <a:bodyPr/>
+          <a:lstStyle>
+            <a:lvl1pPr defTabSz="694944">
+              <a:defRPr sz="2100">
+                <a:latin typeface="Oswald"/>
+                <a:ea typeface="Oswald"/>
+                <a:cs typeface="Oswald"/>
+                <a:sym typeface="Oswald"/>
+              </a:defRPr>
+            </a:lvl1pPr>
+          </a:lstStyle>
+          <a:p>
+            <a:pPr/>
+            <a:r>
+              <a:t>Decentralized Planet 4 Team</a:t>
+            </a:r>
+          </a:p>
+        </p:txBody>
+      </p:sp>
+    </p:spTree>
+  </p:cSld>
+  <p:clrMapOvr>
+    <a:masterClrMapping/>
+  </p:clrMapOvr>
+  <p:transition xmlns:p14="http://schemas.microsoft.com/office/powerpoint/2010/main" spd="med" advClick="1"/>
+</p:sld>
+</file>
+
+<file path=ppt/slides/slide8.xml><?xml version="1.0" encoding="utf-8"?>
 <p:sld xmlns:a="http://schemas.openxmlformats.org/drawingml/2006/main" xmlns:r="http://schemas.openxmlformats.org/officeDocument/2006/relationships" xmlns:p="http://schemas.openxmlformats.org/presentationml/2006/main" showMasterSp="1" showMasterPhAnim="1">
   <p:cSld>
     <p:bg>
@@ -6259,7 +6786,7 @@
       </p:grpSpPr>
       <p:sp>
         <p:nvSpPr>
-          <p:cNvPr id="156" name="Shape 157"/>
+          <p:cNvPr id="161" name="Shape 157"/>
           <p:cNvSpPr txBox="1"/>
           <p:nvPr>
             <p:ph type="subTitle" sz="quarter" idx="1"/>
@@ -6267,8 +6794,8 @@
         </p:nvSpPr>
         <p:spPr>
           <a:xfrm>
-            <a:off x="311699" y="2252574"/>
-            <a:ext cx="8520602" cy="792601"/>
+            <a:off x="311699" y="2252573"/>
+            <a:ext cx="8520602" cy="792602"/>
           </a:xfrm>
           <a:prstGeom prst="rect">
             <a:avLst/>
@@ -6281,222 +6808,6 @@
             <a:pPr/>
             <a:r>
               <a:t>Designing for Participation</a:t>
-            </a:r>
-          </a:p>
-        </p:txBody>
-      </p:sp>
-    </p:spTree>
-  </p:cSld>
-  <p:clrMapOvr>
-    <a:masterClrMapping/>
-  </p:clrMapOvr>
-  <p:transition xmlns:p14="http://schemas.microsoft.com/office/powerpoint/2010/main" spd="med" advClick="1"/>
-</p:sld>
-</file>
-
-<file path=ppt/slides/slide8.xml><?xml version="1.0" encoding="utf-8"?>
-<p:sld xmlns:a="http://schemas.openxmlformats.org/drawingml/2006/main" xmlns:r="http://schemas.openxmlformats.org/officeDocument/2006/relationships" xmlns:p="http://schemas.openxmlformats.org/presentationml/2006/main" showMasterSp="1" showMasterPhAnim="1">
-  <p:cSld>
-    <p:spTree>
-      <p:nvGrpSpPr>
-        <p:cNvPr id="1" name=""/>
-        <p:cNvGrpSpPr/>
-        <p:nvPr/>
-      </p:nvGrpSpPr>
-      <p:grpSpPr>
-        <a:xfrm>
-          <a:off x="0" y="0"/>
-          <a:ext cx="0" cy="0"/>
-          <a:chOff x="0" y="0"/>
-          <a:chExt cx="0" cy="0"/>
-        </a:xfrm>
-      </p:grpSpPr>
-      <p:sp>
-        <p:nvSpPr>
-          <p:cNvPr id="160" name="Shape 162"/>
-          <p:cNvSpPr/>
-          <p:nvPr/>
-        </p:nvSpPr>
-        <p:spPr>
-          <a:xfrm>
-            <a:off x="0" y="1193600"/>
-            <a:ext cx="9144000" cy="3518700"/>
-          </a:xfrm>
-          <a:prstGeom prst="rect">
-            <a:avLst/>
-          </a:prstGeom>
-          <a:solidFill>
-            <a:schemeClr val="accent5"/>
-          </a:solidFill>
-          <a:ln w="12700">
-            <a:miter lim="400000"/>
-          </a:ln>
-        </p:spPr>
-        <p:txBody>
-          <a:bodyPr lIns="45719" rIns="45719" anchor="ctr"/>
-          <a:lstStyle/>
-          <a:p>
-            <a:pPr/>
-          </a:p>
-        </p:txBody>
-      </p:sp>
-      <p:sp>
-        <p:nvSpPr>
-          <p:cNvPr id="161" name="Shape 163"/>
-          <p:cNvSpPr txBox="1"/>
-          <p:nvPr>
-            <p:ph type="title" idx="4294967295"/>
-          </p:nvPr>
-        </p:nvSpPr>
-        <p:spPr>
-          <a:xfrm>
-            <a:off x="311699" y="445025"/>
-            <a:ext cx="8520602" cy="572701"/>
-          </a:xfrm>
-          <a:prstGeom prst="rect">
-            <a:avLst/>
-          </a:prstGeom>
-        </p:spPr>
-        <p:txBody>
-          <a:bodyPr/>
-          <a:lstStyle>
-            <a:lvl1pPr defTabSz="694944">
-              <a:defRPr sz="2128">
-                <a:latin typeface="Oswald"/>
-                <a:ea typeface="Oswald"/>
-                <a:cs typeface="Oswald"/>
-                <a:sym typeface="Oswald"/>
-              </a:defRPr>
-            </a:lvl1pPr>
-          </a:lstStyle>
-          <a:p>
-            <a:pPr/>
-            <a:r>
-              <a:t>Hackability &amp; Innovation by Inviting participation</a:t>
-            </a:r>
-          </a:p>
-        </p:txBody>
-      </p:sp>
-      <p:sp>
-        <p:nvSpPr>
-          <p:cNvPr id="162" name="Shape 164"/>
-          <p:cNvSpPr txBox="1"/>
-          <p:nvPr/>
-        </p:nvSpPr>
-        <p:spPr>
-          <a:xfrm>
-            <a:off x="311700" y="1422199"/>
-            <a:ext cx="8259000" cy="2760951"/>
-          </a:xfrm>
-          <a:prstGeom prst="rect">
-            <a:avLst/>
-          </a:prstGeom>
-          <a:ln w="12700">
-            <a:miter lim="400000"/>
-          </a:ln>
-          <a:extLst>
-            <a:ext uri="{C572A759-6A51-4108-AA02-DFA0A04FC94B}">
-              <ma14:wrappingTextBoxFlag xmlns:ma14="http://schemas.microsoft.com/office/mac/drawingml/2011/main" val="1"/>
-            </a:ext>
-          </a:extLst>
-        </p:spPr>
-        <p:txBody>
-          <a:bodyPr lIns="91424" tIns="91424" rIns="91424" bIns="91424">
-            <a:spAutoFit/>
-          </a:bodyPr>
-          <a:lstStyle/>
-          <a:p>
-            <a:pPr marL="457200" indent="-381000">
-              <a:buClr>
-                <a:srgbClr val="F3F3F3"/>
-              </a:buClr>
-              <a:buSzPct val="100000"/>
-              <a:buFont typeface="Roboto Regular"/>
-              <a:buChar char="➔"/>
-              <a:defRPr sz="2200">
-                <a:solidFill>
-                  <a:srgbClr val="F3F3F3"/>
-                </a:solidFill>
-                <a:latin typeface="Roboto Regular"/>
-                <a:ea typeface="Roboto Regular"/>
-                <a:cs typeface="Roboto Regular"/>
-                <a:sym typeface="Roboto Regular"/>
-              </a:defRPr>
-            </a:pPr>
-            <a:r>
-              <a:t>Community Calls. Here’s a guide, this is long term trust building. http://bit.ly/OS-calls</a:t>
-            </a:r>
-          </a:p>
-          <a:p>
-            <a:pPr>
-              <a:defRPr sz="2200"/>
-            </a:pPr>
-            <a:endParaRPr>
-              <a:solidFill>
-                <a:srgbClr val="F3F3F3"/>
-              </a:solidFill>
-              <a:latin typeface="Roboto Regular"/>
-              <a:ea typeface="Roboto Regular"/>
-              <a:cs typeface="Roboto Regular"/>
-              <a:sym typeface="Roboto Regular"/>
-            </a:endParaRPr>
-          </a:p>
-          <a:p>
-            <a:pPr marL="457200" indent="-381000">
-              <a:buClr>
-                <a:srgbClr val="F3F3F3"/>
-              </a:buClr>
-              <a:buSzPct val="100000"/>
-              <a:buFont typeface="Roboto Regular"/>
-              <a:buChar char="➔"/>
-              <a:defRPr sz="2200">
-                <a:solidFill>
-                  <a:srgbClr val="F3F3F3"/>
-                </a:solidFill>
-                <a:latin typeface="Roboto Regular"/>
-                <a:ea typeface="Roboto Regular"/>
-                <a:cs typeface="Roboto Regular"/>
-                <a:sym typeface="Roboto Regular"/>
-              </a:defRPr>
-            </a:pPr>
-            <a:r>
-              <a:t>Individual outreach. It’s so easy to say please and thank you, ask how people are.</a:t>
-            </a:r>
-          </a:p>
-          <a:p>
-            <a:pPr>
-              <a:defRPr sz="2200"/>
-            </a:pPr>
-            <a:endParaRPr>
-              <a:solidFill>
-                <a:srgbClr val="F3F3F3"/>
-              </a:solidFill>
-              <a:latin typeface="Roboto Regular"/>
-              <a:ea typeface="Roboto Regular"/>
-              <a:cs typeface="Roboto Regular"/>
-              <a:sym typeface="Roboto Regular"/>
-            </a:endParaRPr>
-          </a:p>
-          <a:p>
-            <a:pPr marL="457200" indent="-381000">
-              <a:buClr>
-                <a:srgbClr val="F3F3F3"/>
-              </a:buClr>
-              <a:buSzPct val="100000"/>
-              <a:buFont typeface="Roboto Regular"/>
-              <a:buChar char="➔"/>
-              <a:defRPr sz="2200">
-                <a:solidFill>
-                  <a:srgbClr val="F3F3F3"/>
-                </a:solidFill>
-                <a:latin typeface="Roboto Regular"/>
-                <a:ea typeface="Roboto Regular"/>
-                <a:cs typeface="Roboto Regular"/>
-                <a:sym typeface="Roboto Regular"/>
-              </a:defRPr>
-            </a:pPr>
-            <a:r>
-              <a:t>Listening. Amazing what you hear if you learn to listen well.</a:t>
             </a:r>
           </a:p>
         </p:txBody>
@@ -6529,14 +6840,14 @@
       </p:grpSpPr>
       <p:sp>
         <p:nvSpPr>
-          <p:cNvPr id="166" name="Shape 169"/>
+          <p:cNvPr id="165" name="Shape 169"/>
           <p:cNvSpPr txBox="1"/>
           <p:nvPr/>
         </p:nvSpPr>
         <p:spPr>
           <a:xfrm>
             <a:off x="549274" y="2378075"/>
-            <a:ext cx="1812902" cy="293201"/>
+            <a:ext cx="1812902" cy="293199"/>
           </a:xfrm>
           <a:prstGeom prst="rect">
             <a:avLst/>
@@ -6577,7 +6888,7 @@
       </p:sp>
       <p:pic>
         <p:nvPicPr>
-          <p:cNvPr id="167" name="Shape 170" descr="Shape 170"/>
+          <p:cNvPr id="166" name="Shape 170" descr="Shape 170"/>
           <p:cNvPicPr>
             <a:picLocks noChangeAspect="1"/>
           </p:cNvPicPr>
@@ -6594,7 +6905,7 @@
         <p:spPr>
           <a:xfrm>
             <a:off x="850900" y="1398586"/>
-            <a:ext cx="1177801" cy="741300"/>
+            <a:ext cx="1177801" cy="741301"/>
           </a:xfrm>
           <a:prstGeom prst="rect">
             <a:avLst/>
@@ -6606,7 +6917,7 @@
       </p:pic>
       <p:pic>
         <p:nvPicPr>
-          <p:cNvPr id="168" name="Shape 171" descr="Shape 171"/>
+          <p:cNvPr id="167" name="Shape 171" descr="Shape 171"/>
           <p:cNvPicPr>
             <a:picLocks noChangeAspect="1"/>
           </p:cNvPicPr>
@@ -6635,7 +6946,7 @@
       </p:pic>
       <p:pic>
         <p:nvPicPr>
-          <p:cNvPr id="169" name="Shape 172" descr="Shape 172"/>
+          <p:cNvPr id="168" name="Shape 172" descr="Shape 172"/>
           <p:cNvPicPr>
             <a:picLocks noChangeAspect="1"/>
           </p:cNvPicPr>
@@ -6664,7 +6975,7 @@
       </p:pic>
       <p:pic>
         <p:nvPicPr>
-          <p:cNvPr id="170" name="Shape 173" descr="Shape 173"/>
+          <p:cNvPr id="169" name="Shape 173" descr="Shape 173"/>
           <p:cNvPicPr>
             <a:picLocks noChangeAspect="1"/>
           </p:cNvPicPr>
@@ -6693,7 +7004,7 @@
       </p:pic>
       <p:pic>
         <p:nvPicPr>
-          <p:cNvPr id="171" name="Shape 174" descr="Shape 174"/>
+          <p:cNvPr id="170" name="Shape 174" descr="Shape 174"/>
           <p:cNvPicPr>
             <a:picLocks noChangeAspect="1"/>
           </p:cNvPicPr>
@@ -6709,8 +7020,8 @@
         </p:blipFill>
         <p:spPr>
           <a:xfrm>
-            <a:off x="4070350" y="1662110"/>
-            <a:ext cx="396900" cy="601801"/>
+            <a:off x="4070350" y="1662109"/>
+            <a:ext cx="396900" cy="601802"/>
           </a:xfrm>
           <a:prstGeom prst="rect">
             <a:avLst/>
@@ -6722,14 +7033,14 @@
       </p:pic>
       <p:sp>
         <p:nvSpPr>
-          <p:cNvPr id="172" name="Shape 175"/>
+          <p:cNvPr id="171" name="Shape 175"/>
           <p:cNvSpPr txBox="1"/>
           <p:nvPr/>
         </p:nvSpPr>
         <p:spPr>
           <a:xfrm>
             <a:off x="3382962" y="2390775"/>
-            <a:ext cx="1812901" cy="293201"/>
+            <a:ext cx="1812902" cy="293199"/>
           </a:xfrm>
           <a:prstGeom prst="rect">
             <a:avLst/>
@@ -6770,14 +7081,14 @@
       </p:sp>
       <p:sp>
         <p:nvSpPr>
-          <p:cNvPr id="173" name="Shape 176"/>
+          <p:cNvPr id="172" name="Shape 176"/>
           <p:cNvSpPr txBox="1"/>
           <p:nvPr/>
         </p:nvSpPr>
         <p:spPr>
           <a:xfrm>
-            <a:off x="6218237" y="2392360"/>
-            <a:ext cx="2378100" cy="293201"/>
+            <a:off x="6218237" y="2392359"/>
+            <a:ext cx="2378101" cy="293199"/>
           </a:xfrm>
           <a:prstGeom prst="rect">
             <a:avLst/>
@@ -6818,7 +7129,7 @@
       </p:sp>
       <p:pic>
         <p:nvPicPr>
-          <p:cNvPr id="174" name="Shape 177" descr="Shape 177"/>
+          <p:cNvPr id="173" name="Shape 177" descr="Shape 177"/>
           <p:cNvPicPr>
             <a:picLocks noChangeAspect="1"/>
           </p:cNvPicPr>
@@ -6847,14 +7158,14 @@
       </p:pic>
       <p:sp>
         <p:nvSpPr>
-          <p:cNvPr id="175" name="Shape 178"/>
+          <p:cNvPr id="174" name="Shape 178"/>
           <p:cNvSpPr txBox="1"/>
           <p:nvPr/>
         </p:nvSpPr>
         <p:spPr>
           <a:xfrm>
-            <a:off x="615950" y="2759075"/>
-            <a:ext cx="2301900" cy="1356825"/>
+            <a:off x="615950" y="2759074"/>
+            <a:ext cx="2301900" cy="1356824"/>
           </a:xfrm>
           <a:prstGeom prst="rect">
             <a:avLst/>
@@ -6895,14 +7206,14 @@
       </p:sp>
       <p:sp>
         <p:nvSpPr>
-          <p:cNvPr id="176" name="Shape 179"/>
+          <p:cNvPr id="175" name="Shape 179"/>
           <p:cNvSpPr txBox="1"/>
           <p:nvPr/>
         </p:nvSpPr>
         <p:spPr>
           <a:xfrm>
             <a:off x="3441700" y="2759074"/>
-            <a:ext cx="2409900" cy="1356826"/>
+            <a:ext cx="2409900" cy="1356824"/>
           </a:xfrm>
           <a:prstGeom prst="rect">
             <a:avLst/>
@@ -6942,13 +7253,13 @@
               <a:lnSpc>
                 <a:spcPct val="113000"/>
               </a:lnSpc>
+              <a:defRPr sz="1100">
+                <a:latin typeface="Open Sans"/>
+                <a:ea typeface="Open Sans"/>
+                <a:cs typeface="Open Sans"/>
+                <a:sym typeface="Open Sans"/>
+              </a:defRPr>
             </a:pPr>
-            <a:endParaRPr sz="1100">
-              <a:latin typeface="Open Sans"/>
-              <a:ea typeface="Open Sans"/>
-              <a:cs typeface="Open Sans"/>
-              <a:sym typeface="Open Sans"/>
-            </a:endParaRPr>
           </a:p>
           <a:p>
             <a:pPr>
@@ -6970,14 +7281,14 @@
       </p:sp>
       <p:sp>
         <p:nvSpPr>
-          <p:cNvPr id="177" name="Shape 180"/>
+          <p:cNvPr id="176" name="Shape 180"/>
           <p:cNvSpPr txBox="1"/>
           <p:nvPr/>
         </p:nvSpPr>
         <p:spPr>
           <a:xfrm>
-            <a:off x="6218225" y="2773349"/>
-            <a:ext cx="2817001" cy="2217886"/>
+            <a:off x="6218225" y="2773348"/>
+            <a:ext cx="2817002" cy="2217884"/>
           </a:xfrm>
           <a:prstGeom prst="rect">
             <a:avLst/>
@@ -7017,13 +7328,13 @@
               <a:lnSpc>
                 <a:spcPct val="113000"/>
               </a:lnSpc>
+              <a:defRPr sz="1100">
+                <a:latin typeface="Open Sans"/>
+                <a:ea typeface="Open Sans"/>
+                <a:cs typeface="Open Sans"/>
+                <a:sym typeface="Open Sans"/>
+              </a:defRPr>
             </a:pPr>
-            <a:endParaRPr sz="1100">
-              <a:latin typeface="Open Sans"/>
-              <a:ea typeface="Open Sans"/>
-              <a:cs typeface="Open Sans"/>
-              <a:sym typeface="Open Sans"/>
-            </a:endParaRPr>
           </a:p>
           <a:p>
             <a:pPr>
@@ -7045,7 +7356,7 @@
       </p:sp>
       <p:sp>
         <p:nvSpPr>
-          <p:cNvPr id="178" name="Shape 181"/>
+          <p:cNvPr id="177" name="Shape 181"/>
           <p:cNvSpPr txBox="1"/>
           <p:nvPr>
             <p:ph type="title" idx="4294967295"/>
@@ -7054,7 +7365,7 @@
         <p:spPr>
           <a:xfrm>
             <a:off x="311699" y="445025"/>
-            <a:ext cx="8520602" cy="572701"/>
+            <a:ext cx="8520602" cy="572702"/>
           </a:xfrm>
           <a:prstGeom prst="rect">
             <a:avLst/>
@@ -7064,7 +7375,7 @@
           <a:bodyPr/>
           <a:lstStyle>
             <a:lvl1pPr defTabSz="694944">
-              <a:defRPr sz="2128">
+              <a:defRPr sz="2100">
                 <a:latin typeface="Oswald"/>
                 <a:ea typeface="Oswald"/>
                 <a:cs typeface="Oswald"/>
@@ -7082,7 +7393,7 @@
       </p:sp>
       <p:pic>
         <p:nvPicPr>
-          <p:cNvPr id="179" name="Shape 182" descr="Shape 182"/>
+          <p:cNvPr id="178" name="Shape 182" descr="Shape 182"/>
           <p:cNvPicPr>
             <a:picLocks noChangeAspect="1"/>
           </p:cNvPicPr>
@@ -7099,7 +7410,7 @@
         <p:spPr>
           <a:xfrm>
             <a:off x="4408487" y="1490661"/>
-            <a:ext cx="396901" cy="601800"/>
+            <a:ext cx="396902" cy="601801"/>
           </a:xfrm>
           <a:prstGeom prst="rect">
             <a:avLst/>
@@ -7263,9 +7574,9 @@
         </a:effectStyle>
         <a:effectStyle>
           <a:effectLst>
-            <a:outerShdw sx="100000" sy="100000" kx="0" ky="0" algn="b" rotWithShape="0" blurRad="38100" dist="20000" dir="5400000">
+            <a:outerShdw sx="100000" sy="100000" kx="0" ky="0" algn="b" rotWithShape="0" blurRad="38100" dist="23000" dir="5400000">
               <a:srgbClr val="000000">
-                <a:alpha val="38000"/>
+                <a:alpha val="35000"/>
               </a:srgbClr>
             </a:outerShdw>
           </a:effectLst>
@@ -7345,7 +7656,7 @@
         </a:effectLst>
         <a:sp3d/>
       </a:spPr>
-      <a:bodyPr rot="0" spcFirstLastPara="1" vertOverflow="overflow" horzOverflow="overflow" vert="horz" wrap="square" lIns="45719" tIns="45719" rIns="45719" bIns="45719" numCol="1" spcCol="38100" rtlCol="0" anchor="ctr" upright="0">
+      <a:bodyPr rot="0" spcFirstLastPara="1" vertOverflow="overflow" horzOverflow="overflow" vert="horz" wrap="square" lIns="45718" tIns="45718" rIns="45718" bIns="45718" numCol="1" spcCol="38100" rtlCol="0" anchor="ctr" upright="0">
         <a:spAutoFit/>
       </a:bodyPr>
       <a:lstStyle>
@@ -7373,10 +7684,10 @@
             </a:solidFill>
             <a:effectLst/>
             <a:uFillTx/>
-            <a:latin typeface="Arial"/>
-            <a:ea typeface="Arial"/>
-            <a:cs typeface="Arial"/>
-            <a:sym typeface="Arial"/>
+            <a:latin typeface="+mn-lt"/>
+            <a:ea typeface="+mn-ea"/>
+            <a:cs typeface="+mn-cs"/>
+            <a:sym typeface="Helvetica"/>
           </a:defRPr>
         </a:defPPr>
         <a:lvl1pPr marL="0" marR="0" indent="0" algn="l" defTabSz="914400" rtl="0" fontAlgn="auto" latinLnBrk="1" hangingPunct="0">
@@ -7632,9 +7943,9 @@
           <a:round/>
         </a:ln>
         <a:effectLst>
-          <a:outerShdw sx="100000" sy="100000" kx="0" ky="0" algn="b" rotWithShape="0" blurRad="38100" dist="20000" dir="5400000">
+          <a:outerShdw sx="100000" sy="100000" kx="0" ky="0" algn="b" rotWithShape="0" blurRad="38100" dist="23000" dir="5400000">
             <a:srgbClr val="000000">
-              <a:alpha val="38000"/>
+              <a:alpha val="35000"/>
             </a:srgbClr>
           </a:outerShdw>
         </a:effectLst>
@@ -7922,7 +8233,7 @@
         <a:effectLst/>
         <a:sp3d/>
       </a:spPr>
-      <a:bodyPr rot="0" spcFirstLastPara="1" vertOverflow="overflow" horzOverflow="overflow" vert="horz" wrap="square" lIns="45719" tIns="45719" rIns="45719" bIns="45719" numCol="1" spcCol="38100" rtlCol="0" anchor="t" upright="0">
+      <a:bodyPr rot="0" spcFirstLastPara="1" vertOverflow="overflow" horzOverflow="overflow" vert="horz" wrap="square" lIns="45718" tIns="45718" rIns="45718" bIns="45718" numCol="1" spcCol="38100" rtlCol="0" anchor="t" upright="0">
         <a:spAutoFit/>
       </a:bodyPr>
       <a:lstStyle>
@@ -7950,10 +8261,10 @@
             </a:solidFill>
             <a:effectLst/>
             <a:uFillTx/>
-            <a:latin typeface="Arial"/>
-            <a:ea typeface="Arial"/>
-            <a:cs typeface="Arial"/>
-            <a:sym typeface="Arial"/>
+            <a:latin typeface="+mn-lt"/>
+            <a:ea typeface="+mn-ea"/>
+            <a:cs typeface="+mn-cs"/>
+            <a:sym typeface="Helvetica"/>
           </a:defRPr>
         </a:defPPr>
         <a:lvl1pPr marL="0" marR="0" indent="0" algn="l" defTabSz="914400" rtl="0" fontAlgn="auto" latinLnBrk="1" hangingPunct="0">
@@ -8347,9 +8658,9 @@
         </a:effectStyle>
         <a:effectStyle>
           <a:effectLst>
-            <a:outerShdw sx="100000" sy="100000" kx="0" ky="0" algn="b" rotWithShape="0" blurRad="38100" dist="20000" dir="5400000">
+            <a:outerShdw sx="100000" sy="100000" kx="0" ky="0" algn="b" rotWithShape="0" blurRad="38100" dist="23000" dir="5400000">
               <a:srgbClr val="000000">
-                <a:alpha val="38000"/>
+                <a:alpha val="35000"/>
               </a:srgbClr>
             </a:outerShdw>
           </a:effectLst>
@@ -8429,7 +8740,7 @@
         </a:effectLst>
         <a:sp3d/>
       </a:spPr>
-      <a:bodyPr rot="0" spcFirstLastPara="1" vertOverflow="overflow" horzOverflow="overflow" vert="horz" wrap="square" lIns="45719" tIns="45719" rIns="45719" bIns="45719" numCol="1" spcCol="38100" rtlCol="0" anchor="ctr" upright="0">
+      <a:bodyPr rot="0" spcFirstLastPara="1" vertOverflow="overflow" horzOverflow="overflow" vert="horz" wrap="square" lIns="45718" tIns="45718" rIns="45718" bIns="45718" numCol="1" spcCol="38100" rtlCol="0" anchor="ctr" upright="0">
         <a:spAutoFit/>
       </a:bodyPr>
       <a:lstStyle>
@@ -8457,10 +8768,10 @@
             </a:solidFill>
             <a:effectLst/>
             <a:uFillTx/>
-            <a:latin typeface="Arial"/>
-            <a:ea typeface="Arial"/>
-            <a:cs typeface="Arial"/>
-            <a:sym typeface="Arial"/>
+            <a:latin typeface="+mn-lt"/>
+            <a:ea typeface="+mn-ea"/>
+            <a:cs typeface="+mn-cs"/>
+            <a:sym typeface="Helvetica"/>
           </a:defRPr>
         </a:defPPr>
         <a:lvl1pPr marL="0" marR="0" indent="0" algn="l" defTabSz="914400" rtl="0" fontAlgn="auto" latinLnBrk="1" hangingPunct="0">
@@ -8716,9 +9027,9 @@
           <a:round/>
         </a:ln>
         <a:effectLst>
-          <a:outerShdw sx="100000" sy="100000" kx="0" ky="0" algn="b" rotWithShape="0" blurRad="38100" dist="20000" dir="5400000">
+          <a:outerShdw sx="100000" sy="100000" kx="0" ky="0" algn="b" rotWithShape="0" blurRad="38100" dist="23000" dir="5400000">
             <a:srgbClr val="000000">
-              <a:alpha val="38000"/>
+              <a:alpha val="35000"/>
             </a:srgbClr>
           </a:outerShdw>
         </a:effectLst>
@@ -9006,7 +9317,7 @@
         <a:effectLst/>
         <a:sp3d/>
       </a:spPr>
-      <a:bodyPr rot="0" spcFirstLastPara="1" vertOverflow="overflow" horzOverflow="overflow" vert="horz" wrap="square" lIns="45719" tIns="45719" rIns="45719" bIns="45719" numCol="1" spcCol="38100" rtlCol="0" anchor="t" upright="0">
+      <a:bodyPr rot="0" spcFirstLastPara="1" vertOverflow="overflow" horzOverflow="overflow" vert="horz" wrap="square" lIns="45718" tIns="45718" rIns="45718" bIns="45718" numCol="1" spcCol="38100" rtlCol="0" anchor="t" upright="0">
         <a:spAutoFit/>
       </a:bodyPr>
       <a:lstStyle>
@@ -9034,10 +9345,10 @@
             </a:solidFill>
             <a:effectLst/>
             <a:uFillTx/>
-            <a:latin typeface="Arial"/>
-            <a:ea typeface="Arial"/>
-            <a:cs typeface="Arial"/>
-            <a:sym typeface="Arial"/>
+            <a:latin typeface="+mn-lt"/>
+            <a:ea typeface="+mn-ea"/>
+            <a:cs typeface="+mn-cs"/>
+            <a:sym typeface="Helvetica"/>
           </a:defRPr>
         </a:defPPr>
         <a:lvl1pPr marL="0" marR="0" indent="0" algn="l" defTabSz="914400" rtl="0" fontAlgn="auto" latinLnBrk="1" hangingPunct="0">

</xml_diff>